<commit_message>
Slide Update - 6/5/20
Slide Update - 6/5/20
</commit_message>
<xml_diff>
--- a/Lectures/(1) Data Manipulation - Basics.pptx
+++ b/Lectures/(1) Data Manipulation - Basics.pptx
@@ -3215,6 +3215,301 @@
               </a:rPr>
               <a:t>LIMIT: constrain the number of rows displayed</a:t>
             </a:r>
+          </a:p>
+          <a:p>
+            <a:pPr marL="0" lvl="0" indent="0" algn="l" rtl="0">
+              <a:spcBef>
+                <a:spcPts val="0"/>
+              </a:spcBef>
+              <a:spcAft>
+                <a:spcPts val="0"/>
+              </a:spcAft>
+              <a:buClr>
+                <a:srgbClr val="000000"/>
+              </a:buClr>
+              <a:buSzPts val="1100"/>
+              <a:buFont typeface="Arial"/>
+              <a:buNone/>
+            </a:pPr>
+            <a:endParaRPr lang="en-US" dirty="0">
+              <a:solidFill>
+                <a:srgbClr val="000000"/>
+              </a:solidFill>
+            </a:endParaRPr>
+          </a:p>
+          <a:p>
+            <a:pPr marL="36899" lvl="0" indent="0" algn="l" rtl="0">
+              <a:lnSpc>
+                <a:spcPct val="115000"/>
+              </a:lnSpc>
+              <a:spcBef>
+                <a:spcPts val="1000"/>
+              </a:spcBef>
+              <a:spcAft>
+                <a:spcPts val="0"/>
+              </a:spcAft>
+              <a:buNone/>
+            </a:pPr>
+            <a:r>
+              <a:rPr lang="en-US" sz="1200" dirty="0">
+                <a:solidFill>
+                  <a:schemeClr val="accent3"/>
+                </a:solidFill>
+                <a:latin typeface="Lato"/>
+                <a:ea typeface="Lato"/>
+                <a:cs typeface="Lato"/>
+                <a:sym typeface="Lato"/>
+              </a:rPr>
+              <a:t>SELECT</a:t>
+            </a:r>
+            <a:r>
+              <a:rPr lang="en-US" sz="1200" dirty="0">
+                <a:solidFill>
+                  <a:schemeClr val="accent1"/>
+                </a:solidFill>
+                <a:latin typeface="Lato"/>
+                <a:ea typeface="Lato"/>
+                <a:cs typeface="Lato"/>
+                <a:sym typeface="Lato"/>
+              </a:rPr>
+              <a:t> continent,  name AS country </a:t>
+            </a:r>
+            <a:r>
+              <a:rPr lang="en-US" sz="1200" dirty="0">
+                <a:solidFill>
+                  <a:srgbClr val="6AA84F"/>
+                </a:solidFill>
+                <a:latin typeface="Lato"/>
+                <a:ea typeface="Lato"/>
+                <a:cs typeface="Lato"/>
+                <a:sym typeface="Lato"/>
+              </a:rPr>
+              <a:t>#what columns to get</a:t>
+            </a:r>
+          </a:p>
+          <a:p>
+            <a:pPr marL="36899" lvl="0" indent="0" algn="l" rtl="0">
+              <a:lnSpc>
+                <a:spcPct val="115000"/>
+              </a:lnSpc>
+              <a:spcBef>
+                <a:spcPts val="1000"/>
+              </a:spcBef>
+              <a:spcAft>
+                <a:spcPts val="0"/>
+              </a:spcAft>
+              <a:buNone/>
+            </a:pPr>
+            <a:r>
+              <a:rPr lang="en-US" sz="1200" dirty="0">
+                <a:solidFill>
+                  <a:schemeClr val="accent3"/>
+                </a:solidFill>
+                <a:latin typeface="Lato"/>
+                <a:ea typeface="Lato"/>
+                <a:cs typeface="Lato"/>
+                <a:sym typeface="Lato"/>
+              </a:rPr>
+              <a:t>FROM</a:t>
+            </a:r>
+            <a:r>
+              <a:rPr lang="en-US" sz="1200" dirty="0">
+                <a:solidFill>
+                  <a:schemeClr val="accent1"/>
+                </a:solidFill>
+                <a:latin typeface="Lato"/>
+                <a:ea typeface="Lato"/>
+                <a:cs typeface="Lato"/>
+                <a:sym typeface="Lato"/>
+              </a:rPr>
+              <a:t> </a:t>
+            </a:r>
+            <a:r>
+              <a:rPr lang="en-US" sz="1200" dirty="0" err="1">
+                <a:solidFill>
+                  <a:schemeClr val="accent1"/>
+                </a:solidFill>
+                <a:latin typeface="Lato"/>
+                <a:ea typeface="Lato"/>
+                <a:cs typeface="Lato"/>
+                <a:sym typeface="Lato"/>
+              </a:rPr>
+              <a:t>world.country</a:t>
+            </a:r>
+            <a:r>
+              <a:rPr lang="en-US" sz="1200" dirty="0">
+                <a:solidFill>
+                  <a:schemeClr val="accent1"/>
+                </a:solidFill>
+                <a:latin typeface="Lato"/>
+                <a:ea typeface="Lato"/>
+                <a:cs typeface="Lato"/>
+                <a:sym typeface="Lato"/>
+              </a:rPr>
+              <a:t> </a:t>
+            </a:r>
+            <a:r>
+              <a:rPr lang="en-US" sz="1200" dirty="0">
+                <a:solidFill>
+                  <a:srgbClr val="6AA84F"/>
+                </a:solidFill>
+                <a:latin typeface="Lato"/>
+                <a:ea typeface="Lato"/>
+                <a:cs typeface="Lato"/>
+                <a:sym typeface="Lato"/>
+              </a:rPr>
+              <a:t>#what schema/table to read</a:t>
+            </a:r>
+          </a:p>
+          <a:p>
+            <a:pPr marL="36899" lvl="0">
+              <a:lnSpc>
+                <a:spcPct val="115000"/>
+              </a:lnSpc>
+              <a:spcBef>
+                <a:spcPts val="1000"/>
+              </a:spcBef>
+            </a:pPr>
+            <a:r>
+              <a:rPr lang="en-US" sz="1200" dirty="0">
+                <a:solidFill>
+                  <a:schemeClr val="accent1"/>
+                </a:solidFill>
+                <a:latin typeface="Lato"/>
+                <a:ea typeface="Lato"/>
+                <a:cs typeface="Lato"/>
+                <a:sym typeface="Lato"/>
+              </a:rPr>
+              <a:t>WHERE continent  = ' </a:t>
+            </a:r>
+            <a:r>
+              <a:rPr lang="en-US" sz="1200" dirty="0" err="1">
+                <a:solidFill>
+                  <a:schemeClr val="accent1"/>
+                </a:solidFill>
+                <a:latin typeface="Lato"/>
+                <a:ea typeface="Lato"/>
+                <a:cs typeface="Lato"/>
+                <a:sym typeface="Lato"/>
+              </a:rPr>
+              <a:t>asia</a:t>
+            </a:r>
+            <a:r>
+              <a:rPr lang="en-US" sz="1200" dirty="0">
+                <a:solidFill>
+                  <a:schemeClr val="accent1"/>
+                </a:solidFill>
+                <a:latin typeface="Lato"/>
+                <a:ea typeface="Lato"/>
+                <a:cs typeface="Lato"/>
+                <a:sym typeface="Lato"/>
+              </a:rPr>
+              <a:t>' </a:t>
+            </a:r>
+            <a:r>
+              <a:rPr lang="en-US" sz="1200" dirty="0">
+                <a:solidFill>
+                  <a:srgbClr val="6AA84F"/>
+                </a:solidFill>
+                <a:latin typeface="Lato"/>
+                <a:ea typeface="Lato"/>
+                <a:cs typeface="Lato"/>
+                <a:sym typeface="Lato"/>
+              </a:rPr>
+              <a:t>#limit results”</a:t>
+            </a:r>
+          </a:p>
+          <a:p>
+            <a:pPr marL="36899" lvl="0" indent="0" algn="l" rtl="0">
+              <a:lnSpc>
+                <a:spcPct val="115000"/>
+              </a:lnSpc>
+              <a:spcBef>
+                <a:spcPts val="1000"/>
+              </a:spcBef>
+              <a:spcAft>
+                <a:spcPts val="0"/>
+              </a:spcAft>
+              <a:buNone/>
+            </a:pPr>
+            <a:r>
+              <a:rPr lang="en-US" sz="1200" dirty="0">
+                <a:solidFill>
+                  <a:schemeClr val="accent1"/>
+                </a:solidFill>
+                <a:latin typeface="Lato"/>
+                <a:ea typeface="Lato"/>
+                <a:cs typeface="Lato"/>
+                <a:sym typeface="Lato"/>
+              </a:rPr>
+              <a:t>ORDER BY continent, country DESC  </a:t>
+            </a:r>
+            <a:r>
+              <a:rPr lang="en-US" sz="1200" dirty="0">
+                <a:solidFill>
+                  <a:srgbClr val="6AA84F"/>
+                </a:solidFill>
+                <a:latin typeface="Lato"/>
+                <a:ea typeface="Lato"/>
+                <a:cs typeface="Lato"/>
+                <a:sym typeface="Lato"/>
+              </a:rPr>
+              <a:t>#Sort rows in result”</a:t>
+            </a:r>
+          </a:p>
+          <a:p>
+            <a:pPr marL="36899" lvl="0" indent="0" algn="l" rtl="0">
+              <a:lnSpc>
+                <a:spcPct val="115000"/>
+              </a:lnSpc>
+              <a:spcBef>
+                <a:spcPts val="1000"/>
+              </a:spcBef>
+              <a:spcAft>
+                <a:spcPts val="0"/>
+              </a:spcAft>
+              <a:buNone/>
+            </a:pPr>
+            <a:r>
+              <a:rPr lang="en-US" sz="1200" dirty="0">
+                <a:solidFill>
+                  <a:schemeClr val="accent1"/>
+                </a:solidFill>
+                <a:latin typeface="Lato"/>
+                <a:ea typeface="Lato"/>
+                <a:cs typeface="Lato"/>
+                <a:sym typeface="Lato"/>
+              </a:rPr>
+              <a:t>LIMIT 10 </a:t>
+            </a:r>
+            <a:r>
+              <a:rPr lang="en-US" sz="1200" dirty="0">
+                <a:solidFill>
+                  <a:srgbClr val="6AA84F"/>
+                </a:solidFill>
+                <a:latin typeface="Lato"/>
+                <a:ea typeface="Lato"/>
+                <a:cs typeface="Lato"/>
+                <a:sym typeface="Lato"/>
+              </a:rPr>
+              <a:t>#number of rows to “bring back”</a:t>
+            </a:r>
+          </a:p>
+          <a:p>
+            <a:pPr marL="0" lvl="0" indent="0" algn="l" rtl="0">
+              <a:spcBef>
+                <a:spcPts val="0"/>
+              </a:spcBef>
+              <a:spcAft>
+                <a:spcPts val="0"/>
+              </a:spcAft>
+              <a:buClr>
+                <a:srgbClr val="000000"/>
+              </a:buClr>
+              <a:buSzPts val="1100"/>
+              <a:buFont typeface="Arial"/>
+              <a:buNone/>
+            </a:pPr>
             <a:endParaRPr dirty="0"/>
           </a:p>
         </p:txBody>
@@ -15490,7 +15785,7 @@
                 <a:cs typeface="Lato"/>
                 <a:sym typeface="Lato"/>
               </a:rPr>
-              <a:t> continent,  name as country </a:t>
+              <a:t> continent,  name AS country </a:t>
             </a:r>
             <a:r>
               <a:rPr lang="en-US" sz="2000" dirty="0">
@@ -15598,17 +15893,13 @@
             </a:endParaRPr>
           </a:p>
           <a:p>
-            <a:pPr marL="36899" lvl="0" indent="0" algn="l" rtl="0">
+            <a:pPr marL="36899" lvl="0">
               <a:lnSpc>
                 <a:spcPct val="115000"/>
               </a:lnSpc>
               <a:spcBef>
                 <a:spcPts val="1000"/>
               </a:spcBef>
-              <a:spcAft>
-                <a:spcPts val="0"/>
-              </a:spcAft>
-              <a:buNone/>
             </a:pPr>
             <a:r>
               <a:rPr lang="en-US" sz="2000" dirty="0">
@@ -15620,7 +15911,7 @@
                 <a:cs typeface="Lato"/>
                 <a:sym typeface="Lato"/>
               </a:rPr>
-              <a:t>WHERE continent  = ‘</a:t>
+              <a:t>WHERE continent  = ' </a:t>
             </a:r>
             <a:r>
               <a:rPr lang="en-US" sz="2000" dirty="0" err="1">

</xml_diff>

<commit_message>
Coders-To-Callers Update - 6/20/20
</commit_message>
<xml_diff>
--- a/Lectures/(1) Data Manipulation - Basics.pptx
+++ b/Lectures/(1) Data Manipulation - Basics.pptx
@@ -5,7 +5,7 @@
     <p:sldMasterId id="2147483672" r:id="rId1"/>
   </p:sldMasterIdLst>
   <p:notesMasterIdLst>
-    <p:notesMasterId r:id="rId19"/>
+    <p:notesMasterId r:id="rId20"/>
   </p:notesMasterIdLst>
   <p:sldIdLst>
     <p:sldId id="256" r:id="rId2"/>
@@ -21,34 +21,40 @@
     <p:sldId id="267" r:id="rId12"/>
     <p:sldId id="278" r:id="rId13"/>
     <p:sldId id="274" r:id="rId14"/>
-    <p:sldId id="260" r:id="rId15"/>
-    <p:sldId id="269" r:id="rId16"/>
-    <p:sldId id="285" r:id="rId17"/>
-    <p:sldId id="289" r:id="rId18"/>
+    <p:sldId id="297" r:id="rId15"/>
+    <p:sldId id="260" r:id="rId16"/>
+    <p:sldId id="269" r:id="rId17"/>
+    <p:sldId id="285" r:id="rId18"/>
+    <p:sldId id="289" r:id="rId19"/>
   </p:sldIdLst>
   <p:sldSz cx="12192000" cy="6858000"/>
   <p:notesSz cx="6858000" cy="9144000"/>
   <p:embeddedFontLst>
     <p:embeddedFont>
       <p:font typeface="Calibri" panose="020F0502020204030204" pitchFamily="34" charset="0"/>
-      <p:regular r:id="rId20"/>
-      <p:bold r:id="rId21"/>
-      <p:italic r:id="rId22"/>
-      <p:boldItalic r:id="rId23"/>
+      <p:regular r:id="rId21"/>
+      <p:bold r:id="rId22"/>
+      <p:italic r:id="rId23"/>
+      <p:boldItalic r:id="rId24"/>
     </p:embeddedFont>
     <p:embeddedFont>
       <p:font typeface="Lato" panose="020B0604020202020204" charset="0"/>
-      <p:regular r:id="rId24"/>
-      <p:bold r:id="rId25"/>
-      <p:italic r:id="rId26"/>
-      <p:boldItalic r:id="rId27"/>
+      <p:regular r:id="rId25"/>
+      <p:bold r:id="rId26"/>
+      <p:italic r:id="rId27"/>
+      <p:boldItalic r:id="rId28"/>
     </p:embeddedFont>
     <p:embeddedFont>
       <p:font typeface="Raleway" panose="020B0604020202020204" charset="0"/>
-      <p:regular r:id="rId28"/>
-      <p:bold r:id="rId29"/>
-      <p:italic r:id="rId30"/>
-      <p:boldItalic r:id="rId31"/>
+      <p:regular r:id="rId29"/>
+      <p:bold r:id="rId30"/>
+      <p:italic r:id="rId31"/>
+      <p:boldItalic r:id="rId32"/>
+    </p:embeddedFont>
+    <p:embeddedFont>
+      <p:font typeface="Tahoma" panose="020B0604030504040204" pitchFamily="34" charset="0"/>
+      <p:regular r:id="rId33"/>
+      <p:bold r:id="rId34"/>
     </p:embeddedFont>
   </p:embeddedFontLst>
   <p:defaultTextStyle>
@@ -2925,6 +2931,517 @@
   <p:cSld>
     <p:spTree>
       <p:nvGrpSpPr>
+        <p:cNvPr id="1" name="Shape 193"/>
+        <p:cNvGrpSpPr/>
+        <p:nvPr/>
+      </p:nvGrpSpPr>
+      <p:grpSpPr>
+        <a:xfrm>
+          <a:off x="0" y="0"/>
+          <a:ext cx="0" cy="0"/>
+          <a:chOff x="0" y="0"/>
+          <a:chExt cx="0" cy="0"/>
+        </a:xfrm>
+      </p:grpSpPr>
+      <p:sp>
+        <p:nvSpPr>
+          <p:cNvPr id="194" name="Google Shape;194;g5038ce4af1_0_385:notes"/>
+          <p:cNvSpPr txBox="1">
+            <a:spLocks noGrp="1"/>
+          </p:cNvSpPr>
+          <p:nvPr>
+            <p:ph type="body" idx="1"/>
+          </p:nvPr>
+        </p:nvSpPr>
+        <p:spPr>
+          <a:xfrm>
+            <a:off x="685800" y="4400550"/>
+            <a:ext cx="5486400" cy="3600600"/>
+          </a:xfrm>
+          <a:prstGeom prst="rect">
+            <a:avLst/>
+          </a:prstGeom>
+        </p:spPr>
+        <p:txBody>
+          <a:bodyPr spcFirstLastPara="1" wrap="square" lIns="91425" tIns="45700" rIns="91425" bIns="45700" anchor="t" anchorCtr="0">
+            <a:noAutofit/>
+          </a:bodyPr>
+          <a:lstStyle/>
+          <a:p>
+            <a:pPr marL="0" indent="0">
+              <a:lnSpc>
+                <a:spcPct val="100000"/>
+              </a:lnSpc>
+              <a:buNone/>
+            </a:pPr>
+            <a:r>
+              <a:rPr lang="en-US" b="1" dirty="0">
+                <a:latin typeface="Courier New" panose="02070309020205020404" pitchFamily="49" charset="0"/>
+                <a:cs typeface="Courier New" panose="02070309020205020404" pitchFamily="49" charset="0"/>
+              </a:rPr>
+              <a:t>General</a:t>
+            </a:r>
+            <a:r>
+              <a:rPr lang="en-US" b="1" baseline="0" dirty="0">
+                <a:latin typeface="Courier New" panose="02070309020205020404" pitchFamily="49" charset="0"/>
+                <a:cs typeface="Courier New" panose="02070309020205020404" pitchFamily="49" charset="0"/>
+              </a:rPr>
+              <a:t> Syntax:</a:t>
+            </a:r>
+            <a:endParaRPr lang="en-US" b="1" dirty="0">
+              <a:latin typeface="Courier New" panose="02070309020205020404" pitchFamily="49" charset="0"/>
+              <a:cs typeface="Courier New" panose="02070309020205020404" pitchFamily="49" charset="0"/>
+            </a:endParaRPr>
+          </a:p>
+          <a:p>
+            <a:pPr marL="0" indent="0">
+              <a:lnSpc>
+                <a:spcPct val="100000"/>
+              </a:lnSpc>
+              <a:buNone/>
+            </a:pPr>
+            <a:r>
+              <a:rPr lang="en-US" b="1" dirty="0">
+                <a:latin typeface="Courier New" panose="02070309020205020404" pitchFamily="49" charset="0"/>
+                <a:cs typeface="Courier New" panose="02070309020205020404" pitchFamily="49" charset="0"/>
+              </a:rPr>
+              <a:t>SELECT</a:t>
+            </a:r>
+            <a:r>
+              <a:rPr lang="en-US" dirty="0">
+                <a:latin typeface="Courier New" panose="02070309020205020404" pitchFamily="49" charset="0"/>
+                <a:cs typeface="Courier New" panose="02070309020205020404" pitchFamily="49" charset="0"/>
+              </a:rPr>
+              <a:t> [ALL/DISTINCT] </a:t>
+            </a:r>
+            <a:r>
+              <a:rPr lang="en-US" dirty="0" err="1">
+                <a:latin typeface="Courier New" panose="02070309020205020404" pitchFamily="49" charset="0"/>
+                <a:cs typeface="Courier New" panose="02070309020205020404" pitchFamily="49" charset="0"/>
+              </a:rPr>
+              <a:t>column_list</a:t>
+            </a:r>
+            <a:endParaRPr lang="en-US" dirty="0">
+              <a:latin typeface="Courier New" panose="02070309020205020404" pitchFamily="49" charset="0"/>
+              <a:cs typeface="Courier New" panose="02070309020205020404" pitchFamily="49" charset="0"/>
+            </a:endParaRPr>
+          </a:p>
+          <a:p>
+            <a:pPr marL="0" indent="0">
+              <a:lnSpc>
+                <a:spcPct val="100000"/>
+              </a:lnSpc>
+              <a:buNone/>
+            </a:pPr>
+            <a:r>
+              <a:rPr lang="en-US" b="1" dirty="0">
+                <a:latin typeface="Courier New" panose="02070309020205020404" pitchFamily="49" charset="0"/>
+                <a:cs typeface="Courier New" panose="02070309020205020404" pitchFamily="49" charset="0"/>
+              </a:rPr>
+              <a:t>FROM</a:t>
+            </a:r>
+            <a:r>
+              <a:rPr lang="en-US" dirty="0">
+                <a:latin typeface="Courier New" panose="02070309020205020404" pitchFamily="49" charset="0"/>
+                <a:cs typeface="Courier New" panose="02070309020205020404" pitchFamily="49" charset="0"/>
+              </a:rPr>
+              <a:t> </a:t>
+            </a:r>
+            <a:r>
+              <a:rPr lang="en-US" dirty="0" err="1">
+                <a:latin typeface="Courier New" panose="02070309020205020404" pitchFamily="49" charset="0"/>
+                <a:cs typeface="Courier New" panose="02070309020205020404" pitchFamily="49" charset="0"/>
+              </a:rPr>
+              <a:t>table_list</a:t>
+            </a:r>
+            <a:endParaRPr lang="en-US" dirty="0">
+              <a:latin typeface="Courier New" panose="02070309020205020404" pitchFamily="49" charset="0"/>
+              <a:cs typeface="Courier New" panose="02070309020205020404" pitchFamily="49" charset="0"/>
+            </a:endParaRPr>
+          </a:p>
+          <a:p>
+            <a:pPr marL="0" indent="0">
+              <a:lnSpc>
+                <a:spcPct val="100000"/>
+              </a:lnSpc>
+              <a:buNone/>
+            </a:pPr>
+            <a:r>
+              <a:rPr lang="en-US" dirty="0">
+                <a:latin typeface="Courier New" panose="02070309020205020404" pitchFamily="49" charset="0"/>
+                <a:cs typeface="Courier New" panose="02070309020205020404" pitchFamily="49" charset="0"/>
+              </a:rPr>
+              <a:t>[</a:t>
+            </a:r>
+            <a:r>
+              <a:rPr lang="en-US" b="1" dirty="0">
+                <a:latin typeface="Courier New" panose="02070309020205020404" pitchFamily="49" charset="0"/>
+                <a:cs typeface="Courier New" panose="02070309020205020404" pitchFamily="49" charset="0"/>
+              </a:rPr>
+              <a:t>WHERE</a:t>
+            </a:r>
+            <a:r>
+              <a:rPr lang="en-US" dirty="0">
+                <a:latin typeface="Courier New" panose="02070309020205020404" pitchFamily="49" charset="0"/>
+                <a:cs typeface="Courier New" panose="02070309020205020404" pitchFamily="49" charset="0"/>
+              </a:rPr>
+              <a:t> </a:t>
+            </a:r>
+            <a:r>
+              <a:rPr lang="en-US" dirty="0" err="1">
+                <a:latin typeface="Courier New" panose="02070309020205020404" pitchFamily="49" charset="0"/>
+                <a:cs typeface="Courier New" panose="02070309020205020404" pitchFamily="49" charset="0"/>
+              </a:rPr>
+              <a:t>conditional_expression</a:t>
+            </a:r>
+            <a:r>
+              <a:rPr lang="en-US" dirty="0">
+                <a:latin typeface="Courier New" panose="02070309020205020404" pitchFamily="49" charset="0"/>
+                <a:cs typeface="Courier New" panose="02070309020205020404" pitchFamily="49" charset="0"/>
+              </a:rPr>
+              <a:t>]</a:t>
+            </a:r>
+          </a:p>
+          <a:p>
+            <a:pPr marL="0" indent="0">
+              <a:lnSpc>
+                <a:spcPct val="100000"/>
+              </a:lnSpc>
+              <a:buNone/>
+            </a:pPr>
+            <a:r>
+              <a:rPr lang="en-US" dirty="0">
+                <a:latin typeface="Courier New" panose="02070309020205020404" pitchFamily="49" charset="0"/>
+                <a:cs typeface="Courier New" panose="02070309020205020404" pitchFamily="49" charset="0"/>
+              </a:rPr>
+              <a:t>[</a:t>
+            </a:r>
+            <a:r>
+              <a:rPr lang="en-US" b="1" dirty="0">
+                <a:latin typeface="Courier New" panose="02070309020205020404" pitchFamily="49" charset="0"/>
+                <a:cs typeface="Courier New" panose="02070309020205020404" pitchFamily="49" charset="0"/>
+              </a:rPr>
+              <a:t>GROUP BY</a:t>
+            </a:r>
+            <a:r>
+              <a:rPr lang="en-US" dirty="0">
+                <a:latin typeface="Courier New" panose="02070309020205020404" pitchFamily="49" charset="0"/>
+                <a:cs typeface="Courier New" panose="02070309020205020404" pitchFamily="49" charset="0"/>
+              </a:rPr>
+              <a:t> </a:t>
+            </a:r>
+            <a:r>
+              <a:rPr lang="en-US" dirty="0" err="1">
+                <a:latin typeface="Courier New" panose="02070309020205020404" pitchFamily="49" charset="0"/>
+                <a:cs typeface="Courier New" panose="02070309020205020404" pitchFamily="49" charset="0"/>
+              </a:rPr>
+              <a:t>group_by_column_list</a:t>
+            </a:r>
+            <a:r>
+              <a:rPr lang="en-US" dirty="0">
+                <a:latin typeface="Courier New" panose="02070309020205020404" pitchFamily="49" charset="0"/>
+                <a:cs typeface="Courier New" panose="02070309020205020404" pitchFamily="49" charset="0"/>
+              </a:rPr>
+              <a:t>]</a:t>
+            </a:r>
+          </a:p>
+          <a:p>
+            <a:pPr marL="0" indent="0">
+              <a:lnSpc>
+                <a:spcPct val="100000"/>
+              </a:lnSpc>
+              <a:buNone/>
+            </a:pPr>
+            <a:r>
+              <a:rPr lang="en-US" dirty="0">
+                <a:latin typeface="Courier New" panose="02070309020205020404" pitchFamily="49" charset="0"/>
+                <a:cs typeface="Courier New" panose="02070309020205020404" pitchFamily="49" charset="0"/>
+              </a:rPr>
+              <a:t>[</a:t>
+            </a:r>
+            <a:r>
+              <a:rPr lang="en-US" b="1" dirty="0">
+                <a:latin typeface="Courier New" panose="02070309020205020404" pitchFamily="49" charset="0"/>
+                <a:cs typeface="Courier New" panose="02070309020205020404" pitchFamily="49" charset="0"/>
+              </a:rPr>
+              <a:t>HAVING</a:t>
+            </a:r>
+            <a:r>
+              <a:rPr lang="en-US" dirty="0">
+                <a:latin typeface="Courier New" panose="02070309020205020404" pitchFamily="49" charset="0"/>
+                <a:cs typeface="Courier New" panose="02070309020205020404" pitchFamily="49" charset="0"/>
+              </a:rPr>
+              <a:t> </a:t>
+            </a:r>
+            <a:r>
+              <a:rPr lang="en-US" dirty="0" err="1">
+                <a:latin typeface="Courier New" panose="02070309020205020404" pitchFamily="49" charset="0"/>
+                <a:cs typeface="Courier New" panose="02070309020205020404" pitchFamily="49" charset="0"/>
+              </a:rPr>
+              <a:t>group_by_conditional_expression</a:t>
+            </a:r>
+            <a:r>
+              <a:rPr lang="en-US" dirty="0">
+                <a:latin typeface="Courier New" panose="02070309020205020404" pitchFamily="49" charset="0"/>
+                <a:cs typeface="Courier New" panose="02070309020205020404" pitchFamily="49" charset="0"/>
+              </a:rPr>
+              <a:t>]</a:t>
+            </a:r>
+          </a:p>
+          <a:p>
+            <a:pPr marL="0" indent="0">
+              <a:lnSpc>
+                <a:spcPct val="100000"/>
+              </a:lnSpc>
+              <a:buNone/>
+            </a:pPr>
+            <a:r>
+              <a:rPr lang="en-US" dirty="0">
+                <a:latin typeface="Courier New" panose="02070309020205020404" pitchFamily="49" charset="0"/>
+                <a:cs typeface="Courier New" panose="02070309020205020404" pitchFamily="49" charset="0"/>
+              </a:rPr>
+              <a:t>[</a:t>
+            </a:r>
+            <a:r>
+              <a:rPr lang="en-US" b="1" dirty="0">
+                <a:latin typeface="Courier New" panose="02070309020205020404" pitchFamily="49" charset="0"/>
+                <a:cs typeface="Courier New" panose="02070309020205020404" pitchFamily="49" charset="0"/>
+              </a:rPr>
+              <a:t>ORDER BY</a:t>
+            </a:r>
+            <a:r>
+              <a:rPr lang="en-US" dirty="0">
+                <a:latin typeface="Courier New" panose="02070309020205020404" pitchFamily="49" charset="0"/>
+                <a:cs typeface="Courier New" panose="02070309020205020404" pitchFamily="49" charset="0"/>
+              </a:rPr>
+              <a:t> </a:t>
+            </a:r>
+            <a:r>
+              <a:rPr lang="en-US" dirty="0" err="1">
+                <a:latin typeface="Courier New" panose="02070309020205020404" pitchFamily="49" charset="0"/>
+                <a:cs typeface="Courier New" panose="02070309020205020404" pitchFamily="49" charset="0"/>
+              </a:rPr>
+              <a:t>order_by_column_list</a:t>
+            </a:r>
+            <a:r>
+              <a:rPr lang="en-US" dirty="0">
+                <a:latin typeface="Courier New" panose="02070309020205020404" pitchFamily="49" charset="0"/>
+                <a:cs typeface="Courier New" panose="02070309020205020404" pitchFamily="49" charset="0"/>
+              </a:rPr>
+              <a:t>]</a:t>
+            </a:r>
+          </a:p>
+          <a:p>
+            <a:pPr marL="0" marR="0" lvl="0" indent="0" algn="l" defTabSz="914400" rtl="0" eaLnBrk="1" fontAlgn="auto" latinLnBrk="0" hangingPunct="1">
+              <a:lnSpc>
+                <a:spcPct val="100000"/>
+              </a:lnSpc>
+              <a:spcBef>
+                <a:spcPts val="0"/>
+              </a:spcBef>
+              <a:spcAft>
+                <a:spcPts val="0"/>
+              </a:spcAft>
+              <a:buClr>
+                <a:srgbClr val="000000"/>
+              </a:buClr>
+              <a:buSzPts val="1400"/>
+              <a:buFont typeface="Arial"/>
+              <a:buNone/>
+              <a:tabLst/>
+              <a:defRPr/>
+            </a:pPr>
+            <a:r>
+              <a:rPr lang="en-US" dirty="0">
+                <a:latin typeface="Courier New" panose="02070309020205020404" pitchFamily="49" charset="0"/>
+                <a:cs typeface="Courier New" panose="02070309020205020404" pitchFamily="49" charset="0"/>
+              </a:rPr>
+              <a:t>[</a:t>
+            </a:r>
+            <a:r>
+              <a:rPr lang="en-US" b="1" dirty="0">
+                <a:latin typeface="Courier New" panose="02070309020205020404" pitchFamily="49" charset="0"/>
+                <a:cs typeface="Courier New" panose="02070309020205020404" pitchFamily="49" charset="0"/>
+              </a:rPr>
+              <a:t>LIMIT</a:t>
+            </a:r>
+            <a:r>
+              <a:rPr lang="en-US" dirty="0">
+                <a:latin typeface="Courier New" panose="02070309020205020404" pitchFamily="49" charset="0"/>
+                <a:cs typeface="Courier New" panose="02070309020205020404" pitchFamily="49" charset="0"/>
+              </a:rPr>
+              <a:t> </a:t>
+            </a:r>
+            <a:r>
+              <a:rPr lang="en-US" dirty="0" err="1">
+                <a:latin typeface="Courier New" panose="02070309020205020404" pitchFamily="49" charset="0"/>
+                <a:cs typeface="Courier New" panose="02070309020205020404" pitchFamily="49" charset="0"/>
+              </a:rPr>
+              <a:t>number_of_records</a:t>
+            </a:r>
+            <a:r>
+              <a:rPr lang="en-US" dirty="0">
+                <a:latin typeface="Courier New" panose="02070309020205020404" pitchFamily="49" charset="0"/>
+                <a:cs typeface="Courier New" panose="02070309020205020404" pitchFamily="49" charset="0"/>
+              </a:rPr>
+              <a:t>]</a:t>
+            </a:r>
+          </a:p>
+          <a:p>
+            <a:pPr marL="0" indent="0">
+              <a:lnSpc>
+                <a:spcPct val="100000"/>
+              </a:lnSpc>
+              <a:buNone/>
+            </a:pPr>
+            <a:endParaRPr lang="en-US" dirty="0">
+              <a:latin typeface="Courier New" panose="02070309020205020404" pitchFamily="49" charset="0"/>
+              <a:cs typeface="Courier New" panose="02070309020205020404" pitchFamily="49" charset="0"/>
+            </a:endParaRPr>
+          </a:p>
+          <a:p>
+            <a:pPr marL="0" lvl="0" indent="0" algn="l" rtl="0">
+              <a:spcBef>
+                <a:spcPts val="0"/>
+              </a:spcBef>
+              <a:spcAft>
+                <a:spcPts val="0"/>
+              </a:spcAft>
+              <a:buNone/>
+            </a:pPr>
+            <a:br>
+              <a:rPr lang="en-US" dirty="0"/>
+            </a:br>
+            <a:br>
+              <a:rPr lang="en-US" dirty="0"/>
+            </a:br>
+            <a:r>
+              <a:rPr lang="en-US" dirty="0"/>
+              <a:t>Write a summary of the information as if explaining to a 14 year old. </a:t>
+            </a:r>
+            <a:br>
+              <a:rPr lang="en-US" dirty="0"/>
+            </a:br>
+            <a:r>
+              <a:rPr lang="en-US" dirty="0"/>
+              <a:t>Avoid jargon</a:t>
+            </a:r>
+            <a:br>
+              <a:rPr lang="en-US" dirty="0"/>
+            </a:br>
+            <a:r>
+              <a:rPr lang="en-US" dirty="0"/>
+              <a:t>Keep the words and sentences simple</a:t>
+            </a:r>
+            <a:br>
+              <a:rPr lang="en-US" dirty="0"/>
+            </a:br>
+            <a:r>
+              <a:rPr lang="en-US" dirty="0"/>
+              <a:t>Rely on memory</a:t>
+            </a:r>
+            <a:br>
+              <a:rPr lang="en-US" dirty="0"/>
+            </a:br>
+            <a:r>
+              <a:rPr lang="en-US" dirty="0"/>
+              <a:t>Make the explanation visual, if possible</a:t>
+            </a:r>
+            <a:br>
+              <a:rPr lang="en-US" dirty="0"/>
+            </a:br>
+            <a:br>
+              <a:rPr lang="en-US" dirty="0"/>
+            </a:br>
+            <a:r>
+              <a:rPr lang="en-US" dirty="0"/>
+              <a:t>Note where you had difficulty or have knowledge gaps.</a:t>
+            </a:r>
+            <a:br>
+              <a:rPr lang="en-US" dirty="0"/>
+            </a:br>
+            <a:r>
+              <a:rPr lang="en-US" dirty="0"/>
+              <a:t>These indicate things you should review, research, or ask questions about</a:t>
+            </a:r>
+            <a:br>
+              <a:rPr lang="en-US" dirty="0"/>
+            </a:br>
+            <a:endParaRPr dirty="0"/>
+          </a:p>
+          <a:p>
+            <a:pPr marL="0" lvl="0" indent="0" algn="l" rtl="0">
+              <a:spcBef>
+                <a:spcPts val="0"/>
+              </a:spcBef>
+              <a:spcAft>
+                <a:spcPts val="0"/>
+              </a:spcAft>
+              <a:buNone/>
+            </a:pPr>
+            <a:endParaRPr dirty="0"/>
+          </a:p>
+        </p:txBody>
+      </p:sp>
+      <p:sp>
+        <p:nvSpPr>
+          <p:cNvPr id="195" name="Google Shape;195;g5038ce4af1_0_385:notes"/>
+          <p:cNvSpPr>
+            <a:spLocks noGrp="1" noRot="1" noChangeAspect="1"/>
+          </p:cNvSpPr>
+          <p:nvPr>
+            <p:ph type="sldImg" idx="2"/>
+          </p:nvPr>
+        </p:nvSpPr>
+        <p:spPr>
+          <a:xfrm>
+            <a:off x="685800" y="1143000"/>
+            <a:ext cx="5486400" cy="3086100"/>
+          </a:xfrm>
+          <a:custGeom>
+            <a:avLst/>
+            <a:gdLst/>
+            <a:ahLst/>
+            <a:cxnLst/>
+            <a:rect l="l" t="t" r="r" b="b"/>
+            <a:pathLst>
+              <a:path w="120000" h="120000" extrusionOk="0">
+                <a:moveTo>
+                  <a:pt x="0" y="0"/>
+                </a:moveTo>
+                <a:lnTo>
+                  <a:pt x="120000" y="0"/>
+                </a:lnTo>
+                <a:lnTo>
+                  <a:pt x="120000" y="120000"/>
+                </a:lnTo>
+                <a:lnTo>
+                  <a:pt x="0" y="120000"/>
+                </a:lnTo>
+                <a:close/>
+              </a:path>
+            </a:pathLst>
+          </a:custGeom>
+        </p:spPr>
+      </p:sp>
+    </p:spTree>
+    <p:extLst>
+      <p:ext uri="{BB962C8B-B14F-4D97-AF65-F5344CB8AC3E}">
+        <p14:creationId xmlns:p14="http://schemas.microsoft.com/office/powerpoint/2010/main" val="1371611622"/>
+      </p:ext>
+    </p:extLst>
+  </p:cSld>
+  <p:clrMapOvr>
+    <a:masterClrMapping/>
+  </p:clrMapOvr>
+</p:notes>
+</file>
+
+<file path=ppt/notesSlides/notesSlide15.xml><?xml version="1.0" encoding="utf-8"?>
+<p:notes xmlns:a="http://schemas.openxmlformats.org/drawingml/2006/main" xmlns:r="http://schemas.openxmlformats.org/officeDocument/2006/relationships" xmlns:p="http://schemas.openxmlformats.org/presentationml/2006/main" showMasterSp="0" showMasterPhAnim="0">
+  <p:cSld>
+    <p:spTree>
+      <p:nvGrpSpPr>
         <p:cNvPr id="1" name="Shape 199"/>
         <p:cNvGrpSpPr/>
         <p:nvPr/>
@@ -3501,7 +4018,7 @@
 </p:notes>
 </file>
 
-<file path=ppt/notesSlides/notesSlide15.xml><?xml version="1.0" encoding="utf-8"?>
+<file path=ppt/notesSlides/notesSlide16.xml><?xml version="1.0" encoding="utf-8"?>
 <p:notes xmlns:a="http://schemas.openxmlformats.org/drawingml/2006/main" xmlns:r="http://schemas.openxmlformats.org/officeDocument/2006/relationships" xmlns:p="http://schemas.openxmlformats.org/presentationml/2006/main" showMasterSp="0" showMasterPhAnim="0">
   <p:cSld>
     <p:spTree>
@@ -3605,7 +4122,7 @@
 </p:notes>
 </file>
 
-<file path=ppt/notesSlides/notesSlide16.xml><?xml version="1.0" encoding="utf-8"?>
+<file path=ppt/notesSlides/notesSlide17.xml><?xml version="1.0" encoding="utf-8"?>
 <p:notes xmlns:a="http://schemas.openxmlformats.org/drawingml/2006/main" xmlns:r="http://schemas.openxmlformats.org/officeDocument/2006/relationships" xmlns:p="http://schemas.openxmlformats.org/presentationml/2006/main" showMasterSp="0" showMasterPhAnim="0">
   <p:cSld>
     <p:spTree>
@@ -3709,7 +4226,7 @@
 </p:notes>
 </file>
 
-<file path=ppt/notesSlides/notesSlide17.xml><?xml version="1.0" encoding="utf-8"?>
+<file path=ppt/notesSlides/notesSlide18.xml><?xml version="1.0" encoding="utf-8"?>
 <p:notes xmlns:a="http://schemas.openxmlformats.org/drawingml/2006/main" xmlns:r="http://schemas.openxmlformats.org/officeDocument/2006/relationships" xmlns:p="http://schemas.openxmlformats.org/presentationml/2006/main" showMasterSp="0" showMasterPhAnim="0">
   <p:cSld>
     <p:spTree>
@@ -15495,6 +16012,2990 @@
   <p:cSld>
     <p:spTree>
       <p:nvGrpSpPr>
+        <p:cNvPr id="1" name="Shape 196"/>
+        <p:cNvGrpSpPr/>
+        <p:nvPr/>
+      </p:nvGrpSpPr>
+      <p:grpSpPr>
+        <a:xfrm>
+          <a:off x="0" y="0"/>
+          <a:ext cx="0" cy="0"/>
+          <a:chOff x="0" y="0"/>
+          <a:chExt cx="0" cy="0"/>
+        </a:xfrm>
+      </p:grpSpPr>
+      <p:sp>
+        <p:nvSpPr>
+          <p:cNvPr id="197" name="Google Shape;197;p30"/>
+          <p:cNvSpPr txBox="1">
+            <a:spLocks noGrp="1"/>
+          </p:cNvSpPr>
+          <p:nvPr>
+            <p:ph type="ctrTitle"/>
+          </p:nvPr>
+        </p:nvSpPr>
+        <p:spPr>
+          <a:xfrm>
+            <a:off x="913795" y="609600"/>
+            <a:ext cx="10353900" cy="970500"/>
+          </a:xfrm>
+          <a:prstGeom prst="rect">
+            <a:avLst/>
+          </a:prstGeom>
+          <a:noFill/>
+          <a:ln>
+            <a:noFill/>
+          </a:ln>
+          <a:effectLst>
+            <a:outerShdw blurRad="25400">
+              <a:srgbClr val="000000">
+                <a:alpha val="45880"/>
+              </a:srgbClr>
+            </a:outerShdw>
+          </a:effectLst>
+        </p:spPr>
+        <p:txBody>
+          <a:bodyPr spcFirstLastPara="1" wrap="square" lIns="91425" tIns="45700" rIns="91425" bIns="45700" anchor="ctr" anchorCtr="0">
+            <a:noAutofit/>
+          </a:bodyPr>
+          <a:lstStyle/>
+          <a:p>
+            <a:pPr marL="0" lvl="0" indent="0" algn="l" rtl="0">
+              <a:spcBef>
+                <a:spcPts val="0"/>
+              </a:spcBef>
+              <a:spcAft>
+                <a:spcPts val="0"/>
+              </a:spcAft>
+              <a:buClr>
+                <a:schemeClr val="lt2"/>
+              </a:buClr>
+              <a:buSzPts val="4000"/>
+              <a:buFont typeface="Lustria"/>
+              <a:buNone/>
+            </a:pPr>
+            <a:r>
+              <a:rPr lang="en-US" sz="4800" dirty="0"/>
+              <a:t>Query – Clause Sequence</a:t>
+            </a:r>
+            <a:endParaRPr sz="4800" dirty="0"/>
+          </a:p>
+        </p:txBody>
+      </p:sp>
+      <p:cxnSp>
+        <p:nvCxnSpPr>
+          <p:cNvPr id="5" name="Straight Arrow Connector 4">
+            <a:extLst>
+              <a:ext uri="{FF2B5EF4-FFF2-40B4-BE49-F238E27FC236}">
+                <a16:creationId xmlns:a16="http://schemas.microsoft.com/office/drawing/2014/main" id="{90DC84E7-15DE-4480-925D-EBE3192AFCB6}"/>
+              </a:ext>
+            </a:extLst>
+          </p:cNvPr>
+          <p:cNvCxnSpPr>
+            <a:stCxn id="19" idx="3"/>
+            <a:endCxn id="20" idx="1"/>
+          </p:cNvCxnSpPr>
+          <p:nvPr/>
+        </p:nvCxnSpPr>
+        <p:spPr>
+          <a:xfrm>
+            <a:off x="5064705" y="4360460"/>
+            <a:ext cx="328139" cy="0"/>
+          </a:xfrm>
+          <a:prstGeom prst="straightConnector1">
+            <a:avLst/>
+          </a:prstGeom>
+          <a:ln>
+            <a:tailEnd type="triangle"/>
+          </a:ln>
+        </p:spPr>
+        <p:style>
+          <a:lnRef idx="2">
+            <a:schemeClr val="accent4"/>
+          </a:lnRef>
+          <a:fillRef idx="0">
+            <a:schemeClr val="accent4"/>
+          </a:fillRef>
+          <a:effectRef idx="1">
+            <a:schemeClr val="accent4"/>
+          </a:effectRef>
+          <a:fontRef idx="minor">
+            <a:schemeClr val="tx1"/>
+          </a:fontRef>
+        </p:style>
+      </p:cxnSp>
+      <p:cxnSp>
+        <p:nvCxnSpPr>
+          <p:cNvPr id="7" name="Elbow Connector 9">
+            <a:extLst>
+              <a:ext uri="{FF2B5EF4-FFF2-40B4-BE49-F238E27FC236}">
+                <a16:creationId xmlns:a16="http://schemas.microsoft.com/office/drawing/2014/main" id="{E779E546-74EC-4323-A275-FF91D0806F2F}"/>
+              </a:ext>
+            </a:extLst>
+          </p:cNvPr>
+          <p:cNvCxnSpPr>
+            <a:endCxn id="19" idx="2"/>
+          </p:cNvCxnSpPr>
+          <p:nvPr/>
+        </p:nvCxnSpPr>
+        <p:spPr>
+          <a:xfrm rot="16200000" flipH="1">
+            <a:off x="1731110" y="2064836"/>
+            <a:ext cx="1791977" cy="3468904"/>
+          </a:xfrm>
+          <a:prstGeom prst="bentConnector3">
+            <a:avLst>
+              <a:gd name="adj1" fmla="val 186032"/>
+            </a:avLst>
+          </a:prstGeom>
+          <a:ln>
+            <a:tailEnd type="triangle"/>
+          </a:ln>
+        </p:spPr>
+        <p:style>
+          <a:lnRef idx="2">
+            <a:schemeClr val="accent2"/>
+          </a:lnRef>
+          <a:fillRef idx="0">
+            <a:schemeClr val="accent2"/>
+          </a:fillRef>
+          <a:effectRef idx="1">
+            <a:schemeClr val="accent2"/>
+          </a:effectRef>
+          <a:fontRef idx="minor">
+            <a:schemeClr val="tx1"/>
+          </a:fontRef>
+        </p:style>
+      </p:cxnSp>
+      <p:cxnSp>
+        <p:nvCxnSpPr>
+          <p:cNvPr id="8" name="Straight Arrow Connector 7">
+            <a:extLst>
+              <a:ext uri="{FF2B5EF4-FFF2-40B4-BE49-F238E27FC236}">
+                <a16:creationId xmlns:a16="http://schemas.microsoft.com/office/drawing/2014/main" id="{8490B074-EFA4-4F05-BF96-002C8CFF16B3}"/>
+              </a:ext>
+            </a:extLst>
+          </p:cNvPr>
+          <p:cNvCxnSpPr>
+            <a:endCxn id="21" idx="1"/>
+          </p:cNvCxnSpPr>
+          <p:nvPr/>
+        </p:nvCxnSpPr>
+        <p:spPr>
+          <a:xfrm>
+            <a:off x="1595802" y="2568482"/>
+            <a:ext cx="5531495" cy="0"/>
+          </a:xfrm>
+          <a:prstGeom prst="straightConnector1">
+            <a:avLst/>
+          </a:prstGeom>
+          <a:ln>
+            <a:tailEnd type="triangle"/>
+          </a:ln>
+        </p:spPr>
+        <p:style>
+          <a:lnRef idx="2">
+            <a:schemeClr val="dk1"/>
+          </a:lnRef>
+          <a:fillRef idx="0">
+            <a:schemeClr val="dk1"/>
+          </a:fillRef>
+          <a:effectRef idx="1">
+            <a:schemeClr val="dk1"/>
+          </a:effectRef>
+          <a:fontRef idx="minor">
+            <a:schemeClr val="tx1"/>
+          </a:fontRef>
+        </p:style>
+      </p:cxnSp>
+      <p:cxnSp>
+        <p:nvCxnSpPr>
+          <p:cNvPr id="10" name="Straight Arrow Connector 9">
+            <a:extLst>
+              <a:ext uri="{FF2B5EF4-FFF2-40B4-BE49-F238E27FC236}">
+                <a16:creationId xmlns:a16="http://schemas.microsoft.com/office/drawing/2014/main" id="{F04F5E22-06FB-4094-B6E9-87A1966FAC91}"/>
+              </a:ext>
+            </a:extLst>
+          </p:cNvPr>
+          <p:cNvCxnSpPr>
+            <a:stCxn id="21" idx="3"/>
+          </p:cNvCxnSpPr>
+          <p:nvPr/>
+        </p:nvCxnSpPr>
+        <p:spPr>
+          <a:xfrm>
+            <a:off x="8533610" y="2568482"/>
+            <a:ext cx="2062589" cy="0"/>
+          </a:xfrm>
+          <a:prstGeom prst="straightConnector1">
+            <a:avLst/>
+          </a:prstGeom>
+          <a:ln>
+            <a:tailEnd type="triangle"/>
+          </a:ln>
+        </p:spPr>
+        <p:style>
+          <a:lnRef idx="2">
+            <a:schemeClr val="dk1"/>
+          </a:lnRef>
+          <a:fillRef idx="0">
+            <a:schemeClr val="dk1"/>
+          </a:fillRef>
+          <a:effectRef idx="1">
+            <a:schemeClr val="dk1"/>
+          </a:effectRef>
+          <a:fontRef idx="minor">
+            <a:schemeClr val="tx1"/>
+          </a:fontRef>
+        </p:style>
+      </p:cxnSp>
+      <p:cxnSp>
+        <p:nvCxnSpPr>
+          <p:cNvPr id="11" name="Elbow Connector 67">
+            <a:extLst>
+              <a:ext uri="{FF2B5EF4-FFF2-40B4-BE49-F238E27FC236}">
+                <a16:creationId xmlns:a16="http://schemas.microsoft.com/office/drawing/2014/main" id="{4E2BADBC-BF86-4A6A-9CA6-4B0989E13119}"/>
+              </a:ext>
+            </a:extLst>
+          </p:cNvPr>
+          <p:cNvCxnSpPr>
+            <a:stCxn id="18" idx="0"/>
+            <a:endCxn id="21" idx="1"/>
+          </p:cNvCxnSpPr>
+          <p:nvPr/>
+        </p:nvCxnSpPr>
+        <p:spPr>
+          <a:xfrm rot="5400000" flipH="1" flipV="1">
+            <a:off x="4148618" y="1046964"/>
+            <a:ext cx="1457159" cy="4500199"/>
+          </a:xfrm>
+          <a:prstGeom prst="bentConnector2">
+            <a:avLst/>
+          </a:prstGeom>
+          <a:ln>
+            <a:tailEnd type="triangle"/>
+          </a:ln>
+        </p:spPr>
+        <p:style>
+          <a:lnRef idx="2">
+            <a:schemeClr val="accent1"/>
+          </a:lnRef>
+          <a:fillRef idx="0">
+            <a:schemeClr val="accent1"/>
+          </a:fillRef>
+          <a:effectRef idx="1">
+            <a:schemeClr val="accent1"/>
+          </a:effectRef>
+          <a:fontRef idx="minor">
+            <a:schemeClr val="tx1"/>
+          </a:fontRef>
+        </p:style>
+      </p:cxnSp>
+      <p:cxnSp>
+        <p:nvCxnSpPr>
+          <p:cNvPr id="12" name="Elbow Connector 77">
+            <a:extLst>
+              <a:ext uri="{FF2B5EF4-FFF2-40B4-BE49-F238E27FC236}">
+                <a16:creationId xmlns:a16="http://schemas.microsoft.com/office/drawing/2014/main" id="{922C798B-FE1A-459B-9C1A-319B4BE07BEF}"/>
+              </a:ext>
+            </a:extLst>
+          </p:cNvPr>
+          <p:cNvCxnSpPr>
+            <a:endCxn id="18" idx="1"/>
+          </p:cNvCxnSpPr>
+          <p:nvPr/>
+        </p:nvCxnSpPr>
+        <p:spPr>
+          <a:xfrm rot="16200000" flipH="1">
+            <a:off x="679712" y="3116232"/>
+            <a:ext cx="1457160" cy="1031295"/>
+          </a:xfrm>
+          <a:prstGeom prst="bentConnector2">
+            <a:avLst/>
+          </a:prstGeom>
+          <a:ln>
+            <a:tailEnd type="triangle"/>
+          </a:ln>
+        </p:spPr>
+        <p:style>
+          <a:lnRef idx="2">
+            <a:schemeClr val="accent1"/>
+          </a:lnRef>
+          <a:fillRef idx="0">
+            <a:schemeClr val="accent1"/>
+          </a:fillRef>
+          <a:effectRef idx="1">
+            <a:schemeClr val="accent1"/>
+          </a:effectRef>
+          <a:fontRef idx="minor">
+            <a:schemeClr val="tx1"/>
+          </a:fontRef>
+        </p:style>
+      </p:cxnSp>
+      <p:cxnSp>
+        <p:nvCxnSpPr>
+          <p:cNvPr id="13" name="Straight Arrow Connector 12">
+            <a:extLst>
+              <a:ext uri="{FF2B5EF4-FFF2-40B4-BE49-F238E27FC236}">
+                <a16:creationId xmlns:a16="http://schemas.microsoft.com/office/drawing/2014/main" id="{48282C80-56B2-41F8-A7A5-BE575BC44228}"/>
+              </a:ext>
+            </a:extLst>
+          </p:cNvPr>
+          <p:cNvCxnSpPr>
+            <a:stCxn id="18" idx="3"/>
+            <a:endCxn id="19" idx="1"/>
+          </p:cNvCxnSpPr>
+          <p:nvPr/>
+        </p:nvCxnSpPr>
+        <p:spPr>
+          <a:xfrm>
+            <a:off x="3330253" y="4360460"/>
+            <a:ext cx="328139" cy="0"/>
+          </a:xfrm>
+          <a:prstGeom prst="straightConnector1">
+            <a:avLst/>
+          </a:prstGeom>
+          <a:ln>
+            <a:tailEnd type="triangle"/>
+          </a:ln>
+        </p:spPr>
+        <p:style>
+          <a:lnRef idx="2">
+            <a:schemeClr val="accent2"/>
+          </a:lnRef>
+          <a:fillRef idx="0">
+            <a:schemeClr val="accent2"/>
+          </a:fillRef>
+          <a:effectRef idx="1">
+            <a:schemeClr val="accent2"/>
+          </a:effectRef>
+          <a:fontRef idx="minor">
+            <a:schemeClr val="tx1"/>
+          </a:fontRef>
+        </p:style>
+      </p:cxnSp>
+      <p:cxnSp>
+        <p:nvCxnSpPr>
+          <p:cNvPr id="14" name="Elbow Connector 130">
+            <a:extLst>
+              <a:ext uri="{FF2B5EF4-FFF2-40B4-BE49-F238E27FC236}">
+                <a16:creationId xmlns:a16="http://schemas.microsoft.com/office/drawing/2014/main" id="{6EEBCC33-133A-4F9C-967E-9BF6BFDC4484}"/>
+              </a:ext>
+            </a:extLst>
+          </p:cNvPr>
+          <p:cNvCxnSpPr>
+            <a:stCxn id="21" idx="2"/>
+            <a:endCxn id="22" idx="1"/>
+          </p:cNvCxnSpPr>
+          <p:nvPr/>
+        </p:nvCxnSpPr>
+        <p:spPr>
+          <a:xfrm rot="16200000" flipH="1">
+            <a:off x="7617520" y="3116232"/>
+            <a:ext cx="1457160" cy="1031295"/>
+          </a:xfrm>
+          <a:prstGeom prst="bentConnector2">
+            <a:avLst/>
+          </a:prstGeom>
+          <a:ln>
+            <a:tailEnd type="triangle"/>
+          </a:ln>
+        </p:spPr>
+        <p:style>
+          <a:lnRef idx="2">
+            <a:schemeClr val="accent6"/>
+          </a:lnRef>
+          <a:fillRef idx="0">
+            <a:schemeClr val="accent6"/>
+          </a:fillRef>
+          <a:effectRef idx="1">
+            <a:schemeClr val="accent6"/>
+          </a:effectRef>
+          <a:fontRef idx="minor">
+            <a:schemeClr val="tx1"/>
+          </a:fontRef>
+        </p:style>
+      </p:cxnSp>
+      <p:cxnSp>
+        <p:nvCxnSpPr>
+          <p:cNvPr id="15" name="Elbow Connector 133">
+            <a:extLst>
+              <a:ext uri="{FF2B5EF4-FFF2-40B4-BE49-F238E27FC236}">
+                <a16:creationId xmlns:a16="http://schemas.microsoft.com/office/drawing/2014/main" id="{D7478374-B97C-4B70-B210-3571C0CBF656}"/>
+              </a:ext>
+            </a:extLst>
+          </p:cNvPr>
+          <p:cNvCxnSpPr>
+            <a:stCxn id="22" idx="3"/>
+          </p:cNvCxnSpPr>
+          <p:nvPr/>
+        </p:nvCxnSpPr>
+        <p:spPr>
+          <a:xfrm flipV="1">
+            <a:off x="10268062" y="2903300"/>
+            <a:ext cx="1031295" cy="1457160"/>
+          </a:xfrm>
+          <a:prstGeom prst="bentConnector2">
+            <a:avLst/>
+          </a:prstGeom>
+          <a:ln>
+            <a:tailEnd type="triangle"/>
+          </a:ln>
+        </p:spPr>
+        <p:style>
+          <a:lnRef idx="2">
+            <a:schemeClr val="accent6"/>
+          </a:lnRef>
+          <a:fillRef idx="0">
+            <a:schemeClr val="accent6"/>
+          </a:fillRef>
+          <a:effectRef idx="1">
+            <a:schemeClr val="accent6"/>
+          </a:effectRef>
+          <a:fontRef idx="minor">
+            <a:schemeClr val="tx1"/>
+          </a:fontRef>
+        </p:style>
+      </p:cxnSp>
+      <p:cxnSp>
+        <p:nvCxnSpPr>
+          <p:cNvPr id="16" name="Elbow Connector 11">
+            <a:extLst>
+              <a:ext uri="{FF2B5EF4-FFF2-40B4-BE49-F238E27FC236}">
+                <a16:creationId xmlns:a16="http://schemas.microsoft.com/office/drawing/2014/main" id="{E0DF6256-F8FE-4BEC-967B-E4DE269CFCC6}"/>
+              </a:ext>
+            </a:extLst>
+          </p:cNvPr>
+          <p:cNvCxnSpPr>
+            <a:stCxn id="19" idx="0"/>
+            <a:endCxn id="21" idx="1"/>
+          </p:cNvCxnSpPr>
+          <p:nvPr/>
+        </p:nvCxnSpPr>
+        <p:spPr>
+          <a:xfrm rot="5400000" flipH="1" flipV="1">
+            <a:off x="5015845" y="1914189"/>
+            <a:ext cx="1457159" cy="2765747"/>
+          </a:xfrm>
+          <a:prstGeom prst="bentConnector2">
+            <a:avLst/>
+          </a:prstGeom>
+          <a:ln>
+            <a:tailEnd type="triangle"/>
+          </a:ln>
+        </p:spPr>
+        <p:style>
+          <a:lnRef idx="2">
+            <a:schemeClr val="accent2"/>
+          </a:lnRef>
+          <a:fillRef idx="0">
+            <a:schemeClr val="accent2"/>
+          </a:fillRef>
+          <a:effectRef idx="1">
+            <a:schemeClr val="accent2"/>
+          </a:effectRef>
+          <a:fontRef idx="minor">
+            <a:schemeClr val="tx1"/>
+          </a:fontRef>
+        </p:style>
+      </p:cxnSp>
+      <p:cxnSp>
+        <p:nvCxnSpPr>
+          <p:cNvPr id="17" name="Elbow Connector 88">
+            <a:extLst>
+              <a:ext uri="{FF2B5EF4-FFF2-40B4-BE49-F238E27FC236}">
+                <a16:creationId xmlns:a16="http://schemas.microsoft.com/office/drawing/2014/main" id="{C9BE36D4-7034-4B9B-9C79-5907F68E1DAE}"/>
+              </a:ext>
+            </a:extLst>
+          </p:cNvPr>
+          <p:cNvCxnSpPr>
+            <a:stCxn id="20" idx="0"/>
+            <a:endCxn id="21" idx="1"/>
+          </p:cNvCxnSpPr>
+          <p:nvPr/>
+        </p:nvCxnSpPr>
+        <p:spPr>
+          <a:xfrm rot="5400000" flipH="1" flipV="1">
+            <a:off x="5883070" y="2781416"/>
+            <a:ext cx="1457159" cy="1031295"/>
+          </a:xfrm>
+          <a:prstGeom prst="bentConnector2">
+            <a:avLst/>
+          </a:prstGeom>
+          <a:ln>
+            <a:tailEnd type="triangle"/>
+          </a:ln>
+        </p:spPr>
+        <p:style>
+          <a:lnRef idx="2">
+            <a:schemeClr val="accent4"/>
+          </a:lnRef>
+          <a:fillRef idx="0">
+            <a:schemeClr val="accent4"/>
+          </a:fillRef>
+          <a:effectRef idx="1">
+            <a:schemeClr val="accent4"/>
+          </a:effectRef>
+          <a:fontRef idx="minor">
+            <a:schemeClr val="tx1"/>
+          </a:fontRef>
+        </p:style>
+      </p:cxnSp>
+      <p:sp>
+        <p:nvSpPr>
+          <p:cNvPr id="18" name="Rectangle 17">
+            <a:extLst>
+              <a:ext uri="{FF2B5EF4-FFF2-40B4-BE49-F238E27FC236}">
+                <a16:creationId xmlns:a16="http://schemas.microsoft.com/office/drawing/2014/main" id="{99F7F28A-42BA-4474-8A68-9756D6A680BE}"/>
+              </a:ext>
+            </a:extLst>
+          </p:cNvPr>
+          <p:cNvSpPr/>
+          <p:nvPr/>
+        </p:nvSpPr>
+        <p:spPr>
+          <a:xfrm>
+            <a:off x="1923941" y="4025642"/>
+            <a:ext cx="1406313" cy="669636"/>
+          </a:xfrm>
+          <a:prstGeom prst="rect">
+            <a:avLst/>
+          </a:prstGeom>
+        </p:spPr>
+        <p:style>
+          <a:lnRef idx="2">
+            <a:schemeClr val="accent1">
+              <a:shade val="50000"/>
+            </a:schemeClr>
+          </a:lnRef>
+          <a:fillRef idx="1">
+            <a:schemeClr val="accent1"/>
+          </a:fillRef>
+          <a:effectRef idx="0">
+            <a:schemeClr val="accent1"/>
+          </a:effectRef>
+          <a:fontRef idx="minor">
+            <a:schemeClr val="lt1"/>
+          </a:fontRef>
+        </p:style>
+        <p:txBody>
+          <a:bodyPr rtlCol="0" anchor="ctr"/>
+          <a:lstStyle/>
+          <a:p>
+            <a:pPr algn="ctr"/>
+            <a:r>
+              <a:rPr lang="en-US" sz="1467" dirty="0"/>
+              <a:t>WHERE</a:t>
+            </a:r>
+          </a:p>
+        </p:txBody>
+      </p:sp>
+      <p:sp>
+        <p:nvSpPr>
+          <p:cNvPr id="19" name="Rectangle 18">
+            <a:extLst>
+              <a:ext uri="{FF2B5EF4-FFF2-40B4-BE49-F238E27FC236}">
+                <a16:creationId xmlns:a16="http://schemas.microsoft.com/office/drawing/2014/main" id="{EF1D675F-FF23-47A7-BBEA-1F7A0743064E}"/>
+              </a:ext>
+            </a:extLst>
+          </p:cNvPr>
+          <p:cNvSpPr/>
+          <p:nvPr/>
+        </p:nvSpPr>
+        <p:spPr>
+          <a:xfrm>
+            <a:off x="3658393" y="4025642"/>
+            <a:ext cx="1406313" cy="669636"/>
+          </a:xfrm>
+          <a:prstGeom prst="rect">
+            <a:avLst/>
+          </a:prstGeom>
+        </p:spPr>
+        <p:style>
+          <a:lnRef idx="2">
+            <a:schemeClr val="accent2">
+              <a:shade val="50000"/>
+            </a:schemeClr>
+          </a:lnRef>
+          <a:fillRef idx="1">
+            <a:schemeClr val="accent2"/>
+          </a:fillRef>
+          <a:effectRef idx="0">
+            <a:schemeClr val="accent2"/>
+          </a:effectRef>
+          <a:fontRef idx="minor">
+            <a:schemeClr val="lt1"/>
+          </a:fontRef>
+        </p:style>
+        <p:txBody>
+          <a:bodyPr rtlCol="0" anchor="ctr"/>
+          <a:lstStyle/>
+          <a:p>
+            <a:pPr algn="ctr"/>
+            <a:r>
+              <a:rPr lang="en-US" sz="1467" dirty="0"/>
+              <a:t>GROUP BY</a:t>
+            </a:r>
+          </a:p>
+        </p:txBody>
+      </p:sp>
+      <p:sp>
+        <p:nvSpPr>
+          <p:cNvPr id="20" name="Rectangle 19">
+            <a:extLst>
+              <a:ext uri="{FF2B5EF4-FFF2-40B4-BE49-F238E27FC236}">
+                <a16:creationId xmlns:a16="http://schemas.microsoft.com/office/drawing/2014/main" id="{02EBCF7D-E4DB-4035-9611-818384B0E526}"/>
+              </a:ext>
+            </a:extLst>
+          </p:cNvPr>
+          <p:cNvSpPr/>
+          <p:nvPr/>
+        </p:nvSpPr>
+        <p:spPr>
+          <a:xfrm>
+            <a:off x="5392845" y="4025642"/>
+            <a:ext cx="1406313" cy="669636"/>
+          </a:xfrm>
+          <a:prstGeom prst="rect">
+            <a:avLst/>
+          </a:prstGeom>
+        </p:spPr>
+        <p:style>
+          <a:lnRef idx="2">
+            <a:schemeClr val="accent4">
+              <a:shade val="50000"/>
+            </a:schemeClr>
+          </a:lnRef>
+          <a:fillRef idx="1">
+            <a:schemeClr val="accent4"/>
+          </a:fillRef>
+          <a:effectRef idx="0">
+            <a:schemeClr val="accent4"/>
+          </a:effectRef>
+          <a:fontRef idx="minor">
+            <a:schemeClr val="lt1"/>
+          </a:fontRef>
+        </p:style>
+        <p:txBody>
+          <a:bodyPr rtlCol="0" anchor="ctr"/>
+          <a:lstStyle/>
+          <a:p>
+            <a:pPr algn="ctr"/>
+            <a:r>
+              <a:rPr lang="en-US" sz="1467" dirty="0"/>
+              <a:t>HAVING</a:t>
+            </a:r>
+          </a:p>
+        </p:txBody>
+      </p:sp>
+      <p:sp>
+        <p:nvSpPr>
+          <p:cNvPr id="21" name="Rectangle 20">
+            <a:extLst>
+              <a:ext uri="{FF2B5EF4-FFF2-40B4-BE49-F238E27FC236}">
+                <a16:creationId xmlns:a16="http://schemas.microsoft.com/office/drawing/2014/main" id="{2E9F449B-8F4A-40C2-8579-BB6E67142D50}"/>
+              </a:ext>
+            </a:extLst>
+          </p:cNvPr>
+          <p:cNvSpPr/>
+          <p:nvPr/>
+        </p:nvSpPr>
+        <p:spPr>
+          <a:xfrm>
+            <a:off x="7127297" y="2233664"/>
+            <a:ext cx="1406313" cy="669636"/>
+          </a:xfrm>
+          <a:prstGeom prst="rect">
+            <a:avLst/>
+          </a:prstGeom>
+        </p:spPr>
+        <p:style>
+          <a:lnRef idx="2">
+            <a:schemeClr val="dk1">
+              <a:shade val="50000"/>
+            </a:schemeClr>
+          </a:lnRef>
+          <a:fillRef idx="1">
+            <a:schemeClr val="dk1"/>
+          </a:fillRef>
+          <a:effectRef idx="0">
+            <a:schemeClr val="dk1"/>
+          </a:effectRef>
+          <a:fontRef idx="minor">
+            <a:schemeClr val="lt1"/>
+          </a:fontRef>
+        </p:style>
+        <p:txBody>
+          <a:bodyPr rtlCol="0" anchor="ctr"/>
+          <a:lstStyle/>
+          <a:p>
+            <a:pPr algn="ctr"/>
+            <a:r>
+              <a:rPr lang="en-US" sz="1467" dirty="0"/>
+              <a:t>SELECT</a:t>
+            </a:r>
+          </a:p>
+        </p:txBody>
+      </p:sp>
+      <p:sp>
+        <p:nvSpPr>
+          <p:cNvPr id="22" name="Rectangle 21">
+            <a:extLst>
+              <a:ext uri="{FF2B5EF4-FFF2-40B4-BE49-F238E27FC236}">
+                <a16:creationId xmlns:a16="http://schemas.microsoft.com/office/drawing/2014/main" id="{FCD85F45-DE16-4930-8BDF-214120BD6FAF}"/>
+              </a:ext>
+            </a:extLst>
+          </p:cNvPr>
+          <p:cNvSpPr/>
+          <p:nvPr/>
+        </p:nvSpPr>
+        <p:spPr>
+          <a:xfrm>
+            <a:off x="8861749" y="4025642"/>
+            <a:ext cx="1406313" cy="669636"/>
+          </a:xfrm>
+          <a:prstGeom prst="rect">
+            <a:avLst/>
+          </a:prstGeom>
+        </p:spPr>
+        <p:style>
+          <a:lnRef idx="2">
+            <a:schemeClr val="accent6">
+              <a:shade val="50000"/>
+            </a:schemeClr>
+          </a:lnRef>
+          <a:fillRef idx="1">
+            <a:schemeClr val="accent6"/>
+          </a:fillRef>
+          <a:effectRef idx="0">
+            <a:schemeClr val="accent6"/>
+          </a:effectRef>
+          <a:fontRef idx="minor">
+            <a:schemeClr val="lt1"/>
+          </a:fontRef>
+        </p:style>
+        <p:txBody>
+          <a:bodyPr rtlCol="0" anchor="ctr"/>
+          <a:lstStyle/>
+          <a:p>
+            <a:pPr algn="ctr"/>
+            <a:r>
+              <a:rPr lang="en-US" sz="1467" dirty="0"/>
+              <a:t>ORDER BY</a:t>
+            </a:r>
+          </a:p>
+        </p:txBody>
+      </p:sp>
+      <p:sp>
+        <p:nvSpPr>
+          <p:cNvPr id="23" name="AutoShape 8">
+            <a:extLst>
+              <a:ext uri="{FF2B5EF4-FFF2-40B4-BE49-F238E27FC236}">
+                <a16:creationId xmlns:a16="http://schemas.microsoft.com/office/drawing/2014/main" id="{2858A39F-B949-430A-B76D-4509DDA2C5D6}"/>
+              </a:ext>
+            </a:extLst>
+          </p:cNvPr>
+          <p:cNvSpPr>
+            <a:spLocks/>
+          </p:cNvSpPr>
+          <p:nvPr/>
+        </p:nvSpPr>
+        <p:spPr bwMode="auto">
+          <a:xfrm rot="5400000" flipV="1">
+            <a:off x="4273281" y="2394105"/>
+            <a:ext cx="176540" cy="4875217"/>
+          </a:xfrm>
+          <a:prstGeom prst="rightBrace">
+            <a:avLst>
+              <a:gd name="adj1" fmla="val 174363"/>
+              <a:gd name="adj2" fmla="val 62021"/>
+            </a:avLst>
+          </a:prstGeom>
+          <a:noFill/>
+          <a:ln w="12700">
+            <a:solidFill>
+              <a:schemeClr val="tx1"/>
+            </a:solidFill>
+            <a:round/>
+            <a:headEnd/>
+            <a:tailEnd/>
+          </a:ln>
+          <a:extLst>
+            <a:ext uri="{909E8E84-426E-40DD-AFC4-6F175D3DCCD1}">
+              <a14:hiddenFill xmlns:a14="http://schemas.microsoft.com/office/drawing/2010/main">
+                <a:solidFill>
+                  <a:srgbClr val="FFFFFF"/>
+                </a:solidFill>
+              </a14:hiddenFill>
+            </a:ext>
+          </a:extLst>
+        </p:spPr>
+        <p:txBody>
+          <a:bodyPr wrap="none" anchor="ctr"/>
+          <a:lstStyle>
+            <a:lvl1pPr eaLnBrk="0" hangingPunct="0">
+              <a:defRPr>
+                <a:solidFill>
+                  <a:schemeClr val="tx1"/>
+                </a:solidFill>
+                <a:latin typeface="Tahoma" panose="020B0604030504040204" pitchFamily="34" charset="0"/>
+                <a:cs typeface="Arial" panose="020B0604020202020204" pitchFamily="34" charset="0"/>
+              </a:defRPr>
+            </a:lvl1pPr>
+            <a:lvl2pPr marL="742950" indent="-285750" eaLnBrk="0" hangingPunct="0">
+              <a:defRPr>
+                <a:solidFill>
+                  <a:schemeClr val="tx1"/>
+                </a:solidFill>
+                <a:latin typeface="Tahoma" panose="020B0604030504040204" pitchFamily="34" charset="0"/>
+                <a:cs typeface="Arial" panose="020B0604020202020204" pitchFamily="34" charset="0"/>
+              </a:defRPr>
+            </a:lvl2pPr>
+            <a:lvl3pPr marL="1143000" indent="-228600" eaLnBrk="0" hangingPunct="0">
+              <a:defRPr>
+                <a:solidFill>
+                  <a:schemeClr val="tx1"/>
+                </a:solidFill>
+                <a:latin typeface="Tahoma" panose="020B0604030504040204" pitchFamily="34" charset="0"/>
+                <a:cs typeface="Arial" panose="020B0604020202020204" pitchFamily="34" charset="0"/>
+              </a:defRPr>
+            </a:lvl3pPr>
+            <a:lvl4pPr marL="1600200" indent="-228600" eaLnBrk="0" hangingPunct="0">
+              <a:defRPr>
+                <a:solidFill>
+                  <a:schemeClr val="tx1"/>
+                </a:solidFill>
+                <a:latin typeface="Tahoma" panose="020B0604030504040204" pitchFamily="34" charset="0"/>
+                <a:cs typeface="Arial" panose="020B0604020202020204" pitchFamily="34" charset="0"/>
+              </a:defRPr>
+            </a:lvl4pPr>
+            <a:lvl5pPr marL="2057400" indent="-228600" eaLnBrk="0" hangingPunct="0">
+              <a:defRPr>
+                <a:solidFill>
+                  <a:schemeClr val="tx1"/>
+                </a:solidFill>
+                <a:latin typeface="Tahoma" panose="020B0604030504040204" pitchFamily="34" charset="0"/>
+                <a:cs typeface="Arial" panose="020B0604020202020204" pitchFamily="34" charset="0"/>
+              </a:defRPr>
+            </a:lvl5pPr>
+            <a:lvl6pPr marL="2514600" indent="-228600" eaLnBrk="0" fontAlgn="base" hangingPunct="0">
+              <a:spcBef>
+                <a:spcPct val="0"/>
+              </a:spcBef>
+              <a:spcAft>
+                <a:spcPct val="0"/>
+              </a:spcAft>
+              <a:defRPr>
+                <a:solidFill>
+                  <a:schemeClr val="tx1"/>
+                </a:solidFill>
+                <a:latin typeface="Tahoma" panose="020B0604030504040204" pitchFamily="34" charset="0"/>
+                <a:cs typeface="Arial" panose="020B0604020202020204" pitchFamily="34" charset="0"/>
+              </a:defRPr>
+            </a:lvl6pPr>
+            <a:lvl7pPr marL="2971800" indent="-228600" eaLnBrk="0" fontAlgn="base" hangingPunct="0">
+              <a:spcBef>
+                <a:spcPct val="0"/>
+              </a:spcBef>
+              <a:spcAft>
+                <a:spcPct val="0"/>
+              </a:spcAft>
+              <a:defRPr>
+                <a:solidFill>
+                  <a:schemeClr val="tx1"/>
+                </a:solidFill>
+                <a:latin typeface="Tahoma" panose="020B0604030504040204" pitchFamily="34" charset="0"/>
+                <a:cs typeface="Arial" panose="020B0604020202020204" pitchFamily="34" charset="0"/>
+              </a:defRPr>
+            </a:lvl7pPr>
+            <a:lvl8pPr marL="3429000" indent="-228600" eaLnBrk="0" fontAlgn="base" hangingPunct="0">
+              <a:spcBef>
+                <a:spcPct val="0"/>
+              </a:spcBef>
+              <a:spcAft>
+                <a:spcPct val="0"/>
+              </a:spcAft>
+              <a:defRPr>
+                <a:solidFill>
+                  <a:schemeClr val="tx1"/>
+                </a:solidFill>
+                <a:latin typeface="Tahoma" panose="020B0604030504040204" pitchFamily="34" charset="0"/>
+                <a:cs typeface="Arial" panose="020B0604020202020204" pitchFamily="34" charset="0"/>
+              </a:defRPr>
+            </a:lvl8pPr>
+            <a:lvl9pPr marL="3886200" indent="-228600" eaLnBrk="0" fontAlgn="base" hangingPunct="0">
+              <a:spcBef>
+                <a:spcPct val="0"/>
+              </a:spcBef>
+              <a:spcAft>
+                <a:spcPct val="0"/>
+              </a:spcAft>
+              <a:defRPr>
+                <a:solidFill>
+                  <a:schemeClr val="tx1"/>
+                </a:solidFill>
+                <a:latin typeface="Tahoma" panose="020B0604030504040204" pitchFamily="34" charset="0"/>
+                <a:cs typeface="Arial" panose="020B0604020202020204" pitchFamily="34" charset="0"/>
+              </a:defRPr>
+            </a:lvl9pPr>
+          </a:lstStyle>
+          <a:p>
+            <a:pPr eaLnBrk="1" hangingPunct="1"/>
+            <a:endParaRPr lang="en-US" altLang="en-US" sz="1867" dirty="0">
+              <a:solidFill>
+                <a:schemeClr val="accent1"/>
+              </a:solidFill>
+            </a:endParaRPr>
+          </a:p>
+        </p:txBody>
+      </p:sp>
+      <p:sp>
+        <p:nvSpPr>
+          <p:cNvPr id="24" name="Text Box 7">
+            <a:extLst>
+              <a:ext uri="{FF2B5EF4-FFF2-40B4-BE49-F238E27FC236}">
+                <a16:creationId xmlns:a16="http://schemas.microsoft.com/office/drawing/2014/main" id="{A23E7A31-CF10-4C41-B56E-143A1D5DFF25}"/>
+              </a:ext>
+            </a:extLst>
+          </p:cNvPr>
+          <p:cNvSpPr txBox="1">
+            <a:spLocks noChangeArrowheads="1"/>
+          </p:cNvSpPr>
+          <p:nvPr/>
+        </p:nvSpPr>
+        <p:spPr bwMode="auto">
+          <a:xfrm>
+            <a:off x="4418522" y="4869311"/>
+            <a:ext cx="1061333" cy="318100"/>
+          </a:xfrm>
+          <a:prstGeom prst="rect">
+            <a:avLst/>
+          </a:prstGeom>
+          <a:noFill/>
+          <a:ln>
+            <a:noFill/>
+          </a:ln>
+          <a:extLst>
+            <a:ext uri="{909E8E84-426E-40DD-AFC4-6F175D3DCCD1}">
+              <a14:hiddenFill xmlns:a14="http://schemas.microsoft.com/office/drawing/2010/main">
+                <a:solidFill>
+                  <a:srgbClr val="FFFFFF"/>
+                </a:solidFill>
+              </a14:hiddenFill>
+            </a:ext>
+            <a:ext uri="{91240B29-F687-4F45-9708-019B960494DF}">
+              <a14:hiddenLine xmlns:a14="http://schemas.microsoft.com/office/drawing/2010/main" w="28575">
+                <a:solidFill>
+                  <a:srgbClr val="000000"/>
+                </a:solidFill>
+                <a:miter lim="800000"/>
+                <a:headEnd/>
+                <a:tailEnd/>
+              </a14:hiddenLine>
+            </a:ext>
+          </a:extLst>
+        </p:spPr>
+        <p:txBody>
+          <a:bodyPr wrap="square">
+            <a:spAutoFit/>
+          </a:bodyPr>
+          <a:lstStyle>
+            <a:lvl1pPr eaLnBrk="0" hangingPunct="0">
+              <a:defRPr>
+                <a:solidFill>
+                  <a:schemeClr val="tx1"/>
+                </a:solidFill>
+                <a:latin typeface="Tahoma" panose="020B0604030504040204" pitchFamily="34" charset="0"/>
+                <a:cs typeface="Arial" panose="020B0604020202020204" pitchFamily="34" charset="0"/>
+              </a:defRPr>
+            </a:lvl1pPr>
+            <a:lvl2pPr marL="742950" indent="-285750" eaLnBrk="0" hangingPunct="0">
+              <a:defRPr>
+                <a:solidFill>
+                  <a:schemeClr val="tx1"/>
+                </a:solidFill>
+                <a:latin typeface="Tahoma" panose="020B0604030504040204" pitchFamily="34" charset="0"/>
+                <a:cs typeface="Arial" panose="020B0604020202020204" pitchFamily="34" charset="0"/>
+              </a:defRPr>
+            </a:lvl2pPr>
+            <a:lvl3pPr marL="1143000" indent="-228600" eaLnBrk="0" hangingPunct="0">
+              <a:defRPr>
+                <a:solidFill>
+                  <a:schemeClr val="tx1"/>
+                </a:solidFill>
+                <a:latin typeface="Tahoma" panose="020B0604030504040204" pitchFamily="34" charset="0"/>
+                <a:cs typeface="Arial" panose="020B0604020202020204" pitchFamily="34" charset="0"/>
+              </a:defRPr>
+            </a:lvl3pPr>
+            <a:lvl4pPr marL="1600200" indent="-228600" eaLnBrk="0" hangingPunct="0">
+              <a:defRPr>
+                <a:solidFill>
+                  <a:schemeClr val="tx1"/>
+                </a:solidFill>
+                <a:latin typeface="Tahoma" panose="020B0604030504040204" pitchFamily="34" charset="0"/>
+                <a:cs typeface="Arial" panose="020B0604020202020204" pitchFamily="34" charset="0"/>
+              </a:defRPr>
+            </a:lvl4pPr>
+            <a:lvl5pPr marL="2057400" indent="-228600" eaLnBrk="0" hangingPunct="0">
+              <a:defRPr>
+                <a:solidFill>
+                  <a:schemeClr val="tx1"/>
+                </a:solidFill>
+                <a:latin typeface="Tahoma" panose="020B0604030504040204" pitchFamily="34" charset="0"/>
+                <a:cs typeface="Arial" panose="020B0604020202020204" pitchFamily="34" charset="0"/>
+              </a:defRPr>
+            </a:lvl5pPr>
+            <a:lvl6pPr marL="2514600" indent="-228600" eaLnBrk="0" fontAlgn="base" hangingPunct="0">
+              <a:spcBef>
+                <a:spcPct val="0"/>
+              </a:spcBef>
+              <a:spcAft>
+                <a:spcPct val="0"/>
+              </a:spcAft>
+              <a:defRPr>
+                <a:solidFill>
+                  <a:schemeClr val="tx1"/>
+                </a:solidFill>
+                <a:latin typeface="Tahoma" panose="020B0604030504040204" pitchFamily="34" charset="0"/>
+                <a:cs typeface="Arial" panose="020B0604020202020204" pitchFamily="34" charset="0"/>
+              </a:defRPr>
+            </a:lvl6pPr>
+            <a:lvl7pPr marL="2971800" indent="-228600" eaLnBrk="0" fontAlgn="base" hangingPunct="0">
+              <a:spcBef>
+                <a:spcPct val="0"/>
+              </a:spcBef>
+              <a:spcAft>
+                <a:spcPct val="0"/>
+              </a:spcAft>
+              <a:defRPr>
+                <a:solidFill>
+                  <a:schemeClr val="tx1"/>
+                </a:solidFill>
+                <a:latin typeface="Tahoma" panose="020B0604030504040204" pitchFamily="34" charset="0"/>
+                <a:cs typeface="Arial" panose="020B0604020202020204" pitchFamily="34" charset="0"/>
+              </a:defRPr>
+            </a:lvl7pPr>
+            <a:lvl8pPr marL="3429000" indent="-228600" eaLnBrk="0" fontAlgn="base" hangingPunct="0">
+              <a:spcBef>
+                <a:spcPct val="0"/>
+              </a:spcBef>
+              <a:spcAft>
+                <a:spcPct val="0"/>
+              </a:spcAft>
+              <a:defRPr>
+                <a:solidFill>
+                  <a:schemeClr val="tx1"/>
+                </a:solidFill>
+                <a:latin typeface="Tahoma" panose="020B0604030504040204" pitchFamily="34" charset="0"/>
+                <a:cs typeface="Arial" panose="020B0604020202020204" pitchFamily="34" charset="0"/>
+              </a:defRPr>
+            </a:lvl8pPr>
+            <a:lvl9pPr marL="3886200" indent="-228600" eaLnBrk="0" fontAlgn="base" hangingPunct="0">
+              <a:spcBef>
+                <a:spcPct val="0"/>
+              </a:spcBef>
+              <a:spcAft>
+                <a:spcPct val="0"/>
+              </a:spcAft>
+              <a:defRPr>
+                <a:solidFill>
+                  <a:schemeClr val="tx1"/>
+                </a:solidFill>
+                <a:latin typeface="Tahoma" panose="020B0604030504040204" pitchFamily="34" charset="0"/>
+                <a:cs typeface="Arial" panose="020B0604020202020204" pitchFamily="34" charset="0"/>
+              </a:defRPr>
+            </a:lvl9pPr>
+          </a:lstStyle>
+          <a:p>
+            <a:pPr algn="ctr" eaLnBrk="1" hangingPunct="1"/>
+            <a:r>
+              <a:rPr lang="en-US" altLang="en-US" sz="1467" dirty="0">
+                <a:solidFill>
+                  <a:sysClr val="windowText" lastClr="000000"/>
+                </a:solidFill>
+                <a:latin typeface="+mn-lt"/>
+              </a:rPr>
+              <a:t>Criteria</a:t>
+            </a:r>
+          </a:p>
+        </p:txBody>
+      </p:sp>
+      <p:sp>
+        <p:nvSpPr>
+          <p:cNvPr id="26" name="AutoShape 8">
+            <a:extLst>
+              <a:ext uri="{FF2B5EF4-FFF2-40B4-BE49-F238E27FC236}">
+                <a16:creationId xmlns:a16="http://schemas.microsoft.com/office/drawing/2014/main" id="{B559DCFE-912F-4DB7-BFC1-05466CA77F5F}"/>
+              </a:ext>
+            </a:extLst>
+          </p:cNvPr>
+          <p:cNvSpPr>
+            <a:spLocks/>
+          </p:cNvSpPr>
+          <p:nvPr/>
+        </p:nvSpPr>
+        <p:spPr bwMode="auto">
+          <a:xfrm rot="5400000" flipV="1">
+            <a:off x="9478754" y="4130668"/>
+            <a:ext cx="176535" cy="1402080"/>
+          </a:xfrm>
+          <a:prstGeom prst="rightBrace">
+            <a:avLst>
+              <a:gd name="adj1" fmla="val 174363"/>
+              <a:gd name="adj2" fmla="val 50000"/>
+            </a:avLst>
+          </a:prstGeom>
+          <a:noFill/>
+          <a:ln w="12700">
+            <a:solidFill>
+              <a:schemeClr val="tx1"/>
+            </a:solidFill>
+            <a:round/>
+            <a:headEnd/>
+            <a:tailEnd/>
+          </a:ln>
+          <a:extLst>
+            <a:ext uri="{909E8E84-426E-40DD-AFC4-6F175D3DCCD1}">
+              <a14:hiddenFill xmlns:a14="http://schemas.microsoft.com/office/drawing/2010/main">
+                <a:solidFill>
+                  <a:srgbClr val="FFFFFF"/>
+                </a:solidFill>
+              </a14:hiddenFill>
+            </a:ext>
+          </a:extLst>
+        </p:spPr>
+        <p:txBody>
+          <a:bodyPr wrap="none" anchor="ctr"/>
+          <a:lstStyle>
+            <a:lvl1pPr eaLnBrk="0" hangingPunct="0">
+              <a:defRPr>
+                <a:solidFill>
+                  <a:schemeClr val="tx1"/>
+                </a:solidFill>
+                <a:latin typeface="Tahoma" panose="020B0604030504040204" pitchFamily="34" charset="0"/>
+                <a:cs typeface="Arial" panose="020B0604020202020204" pitchFamily="34" charset="0"/>
+              </a:defRPr>
+            </a:lvl1pPr>
+            <a:lvl2pPr marL="742950" indent="-285750" eaLnBrk="0" hangingPunct="0">
+              <a:defRPr>
+                <a:solidFill>
+                  <a:schemeClr val="tx1"/>
+                </a:solidFill>
+                <a:latin typeface="Tahoma" panose="020B0604030504040204" pitchFamily="34" charset="0"/>
+                <a:cs typeface="Arial" panose="020B0604020202020204" pitchFamily="34" charset="0"/>
+              </a:defRPr>
+            </a:lvl2pPr>
+            <a:lvl3pPr marL="1143000" indent="-228600" eaLnBrk="0" hangingPunct="0">
+              <a:defRPr>
+                <a:solidFill>
+                  <a:schemeClr val="tx1"/>
+                </a:solidFill>
+                <a:latin typeface="Tahoma" panose="020B0604030504040204" pitchFamily="34" charset="0"/>
+                <a:cs typeface="Arial" panose="020B0604020202020204" pitchFamily="34" charset="0"/>
+              </a:defRPr>
+            </a:lvl3pPr>
+            <a:lvl4pPr marL="1600200" indent="-228600" eaLnBrk="0" hangingPunct="0">
+              <a:defRPr>
+                <a:solidFill>
+                  <a:schemeClr val="tx1"/>
+                </a:solidFill>
+                <a:latin typeface="Tahoma" panose="020B0604030504040204" pitchFamily="34" charset="0"/>
+                <a:cs typeface="Arial" panose="020B0604020202020204" pitchFamily="34" charset="0"/>
+              </a:defRPr>
+            </a:lvl4pPr>
+            <a:lvl5pPr marL="2057400" indent="-228600" eaLnBrk="0" hangingPunct="0">
+              <a:defRPr>
+                <a:solidFill>
+                  <a:schemeClr val="tx1"/>
+                </a:solidFill>
+                <a:latin typeface="Tahoma" panose="020B0604030504040204" pitchFamily="34" charset="0"/>
+                <a:cs typeface="Arial" panose="020B0604020202020204" pitchFamily="34" charset="0"/>
+              </a:defRPr>
+            </a:lvl5pPr>
+            <a:lvl6pPr marL="2514600" indent="-228600" eaLnBrk="0" fontAlgn="base" hangingPunct="0">
+              <a:spcBef>
+                <a:spcPct val="0"/>
+              </a:spcBef>
+              <a:spcAft>
+                <a:spcPct val="0"/>
+              </a:spcAft>
+              <a:defRPr>
+                <a:solidFill>
+                  <a:schemeClr val="tx1"/>
+                </a:solidFill>
+                <a:latin typeface="Tahoma" panose="020B0604030504040204" pitchFamily="34" charset="0"/>
+                <a:cs typeface="Arial" panose="020B0604020202020204" pitchFamily="34" charset="0"/>
+              </a:defRPr>
+            </a:lvl6pPr>
+            <a:lvl7pPr marL="2971800" indent="-228600" eaLnBrk="0" fontAlgn="base" hangingPunct="0">
+              <a:spcBef>
+                <a:spcPct val="0"/>
+              </a:spcBef>
+              <a:spcAft>
+                <a:spcPct val="0"/>
+              </a:spcAft>
+              <a:defRPr>
+                <a:solidFill>
+                  <a:schemeClr val="tx1"/>
+                </a:solidFill>
+                <a:latin typeface="Tahoma" panose="020B0604030504040204" pitchFamily="34" charset="0"/>
+                <a:cs typeface="Arial" panose="020B0604020202020204" pitchFamily="34" charset="0"/>
+              </a:defRPr>
+            </a:lvl7pPr>
+            <a:lvl8pPr marL="3429000" indent="-228600" eaLnBrk="0" fontAlgn="base" hangingPunct="0">
+              <a:spcBef>
+                <a:spcPct val="0"/>
+              </a:spcBef>
+              <a:spcAft>
+                <a:spcPct val="0"/>
+              </a:spcAft>
+              <a:defRPr>
+                <a:solidFill>
+                  <a:schemeClr val="tx1"/>
+                </a:solidFill>
+                <a:latin typeface="Tahoma" panose="020B0604030504040204" pitchFamily="34" charset="0"/>
+                <a:cs typeface="Arial" panose="020B0604020202020204" pitchFamily="34" charset="0"/>
+              </a:defRPr>
+            </a:lvl8pPr>
+            <a:lvl9pPr marL="3886200" indent="-228600" eaLnBrk="0" fontAlgn="base" hangingPunct="0">
+              <a:spcBef>
+                <a:spcPct val="0"/>
+              </a:spcBef>
+              <a:spcAft>
+                <a:spcPct val="0"/>
+              </a:spcAft>
+              <a:defRPr>
+                <a:solidFill>
+                  <a:schemeClr val="tx1"/>
+                </a:solidFill>
+                <a:latin typeface="Tahoma" panose="020B0604030504040204" pitchFamily="34" charset="0"/>
+                <a:cs typeface="Arial" panose="020B0604020202020204" pitchFamily="34" charset="0"/>
+              </a:defRPr>
+            </a:lvl9pPr>
+          </a:lstStyle>
+          <a:p>
+            <a:pPr eaLnBrk="1" hangingPunct="1"/>
+            <a:endParaRPr lang="en-US" altLang="en-US" sz="1867" dirty="0">
+              <a:solidFill>
+                <a:schemeClr val="accent1"/>
+              </a:solidFill>
+            </a:endParaRPr>
+          </a:p>
+        </p:txBody>
+      </p:sp>
+      <p:sp>
+        <p:nvSpPr>
+          <p:cNvPr id="27" name="Text Box 7">
+            <a:extLst>
+              <a:ext uri="{FF2B5EF4-FFF2-40B4-BE49-F238E27FC236}">
+                <a16:creationId xmlns:a16="http://schemas.microsoft.com/office/drawing/2014/main" id="{B07207AC-EB0D-4EBE-AE75-5DEDC5A5D2AA}"/>
+              </a:ext>
+            </a:extLst>
+          </p:cNvPr>
+          <p:cNvSpPr txBox="1">
+            <a:spLocks noChangeArrowheads="1"/>
+          </p:cNvSpPr>
+          <p:nvPr/>
+        </p:nvSpPr>
+        <p:spPr bwMode="auto">
+          <a:xfrm>
+            <a:off x="8865981" y="4869311"/>
+            <a:ext cx="1402080" cy="318100"/>
+          </a:xfrm>
+          <a:prstGeom prst="rect">
+            <a:avLst/>
+          </a:prstGeom>
+          <a:noFill/>
+          <a:ln>
+            <a:noFill/>
+          </a:ln>
+          <a:extLst>
+            <a:ext uri="{909E8E84-426E-40DD-AFC4-6F175D3DCCD1}">
+              <a14:hiddenFill xmlns:a14="http://schemas.microsoft.com/office/drawing/2010/main">
+                <a:solidFill>
+                  <a:srgbClr val="FFFFFF"/>
+                </a:solidFill>
+              </a14:hiddenFill>
+            </a:ext>
+            <a:ext uri="{91240B29-F687-4F45-9708-019B960494DF}">
+              <a14:hiddenLine xmlns:a14="http://schemas.microsoft.com/office/drawing/2010/main" w="28575">
+                <a:solidFill>
+                  <a:srgbClr val="000000"/>
+                </a:solidFill>
+                <a:miter lim="800000"/>
+                <a:headEnd/>
+                <a:tailEnd/>
+              </a14:hiddenLine>
+            </a:ext>
+          </a:extLst>
+        </p:spPr>
+        <p:txBody>
+          <a:bodyPr wrap="square">
+            <a:spAutoFit/>
+          </a:bodyPr>
+          <a:lstStyle>
+            <a:lvl1pPr eaLnBrk="0" hangingPunct="0">
+              <a:defRPr>
+                <a:solidFill>
+                  <a:schemeClr val="tx1"/>
+                </a:solidFill>
+                <a:latin typeface="Tahoma" panose="020B0604030504040204" pitchFamily="34" charset="0"/>
+                <a:cs typeface="Arial" panose="020B0604020202020204" pitchFamily="34" charset="0"/>
+              </a:defRPr>
+            </a:lvl1pPr>
+            <a:lvl2pPr marL="742950" indent="-285750" eaLnBrk="0" hangingPunct="0">
+              <a:defRPr>
+                <a:solidFill>
+                  <a:schemeClr val="tx1"/>
+                </a:solidFill>
+                <a:latin typeface="Tahoma" panose="020B0604030504040204" pitchFamily="34" charset="0"/>
+                <a:cs typeface="Arial" panose="020B0604020202020204" pitchFamily="34" charset="0"/>
+              </a:defRPr>
+            </a:lvl2pPr>
+            <a:lvl3pPr marL="1143000" indent="-228600" eaLnBrk="0" hangingPunct="0">
+              <a:defRPr>
+                <a:solidFill>
+                  <a:schemeClr val="tx1"/>
+                </a:solidFill>
+                <a:latin typeface="Tahoma" panose="020B0604030504040204" pitchFamily="34" charset="0"/>
+                <a:cs typeface="Arial" panose="020B0604020202020204" pitchFamily="34" charset="0"/>
+              </a:defRPr>
+            </a:lvl3pPr>
+            <a:lvl4pPr marL="1600200" indent="-228600" eaLnBrk="0" hangingPunct="0">
+              <a:defRPr>
+                <a:solidFill>
+                  <a:schemeClr val="tx1"/>
+                </a:solidFill>
+                <a:latin typeface="Tahoma" panose="020B0604030504040204" pitchFamily="34" charset="0"/>
+                <a:cs typeface="Arial" panose="020B0604020202020204" pitchFamily="34" charset="0"/>
+              </a:defRPr>
+            </a:lvl4pPr>
+            <a:lvl5pPr marL="2057400" indent="-228600" eaLnBrk="0" hangingPunct="0">
+              <a:defRPr>
+                <a:solidFill>
+                  <a:schemeClr val="tx1"/>
+                </a:solidFill>
+                <a:latin typeface="Tahoma" panose="020B0604030504040204" pitchFamily="34" charset="0"/>
+                <a:cs typeface="Arial" panose="020B0604020202020204" pitchFamily="34" charset="0"/>
+              </a:defRPr>
+            </a:lvl5pPr>
+            <a:lvl6pPr marL="2514600" indent="-228600" eaLnBrk="0" fontAlgn="base" hangingPunct="0">
+              <a:spcBef>
+                <a:spcPct val="0"/>
+              </a:spcBef>
+              <a:spcAft>
+                <a:spcPct val="0"/>
+              </a:spcAft>
+              <a:defRPr>
+                <a:solidFill>
+                  <a:schemeClr val="tx1"/>
+                </a:solidFill>
+                <a:latin typeface="Tahoma" panose="020B0604030504040204" pitchFamily="34" charset="0"/>
+                <a:cs typeface="Arial" panose="020B0604020202020204" pitchFamily="34" charset="0"/>
+              </a:defRPr>
+            </a:lvl6pPr>
+            <a:lvl7pPr marL="2971800" indent="-228600" eaLnBrk="0" fontAlgn="base" hangingPunct="0">
+              <a:spcBef>
+                <a:spcPct val="0"/>
+              </a:spcBef>
+              <a:spcAft>
+                <a:spcPct val="0"/>
+              </a:spcAft>
+              <a:defRPr>
+                <a:solidFill>
+                  <a:schemeClr val="tx1"/>
+                </a:solidFill>
+                <a:latin typeface="Tahoma" panose="020B0604030504040204" pitchFamily="34" charset="0"/>
+                <a:cs typeface="Arial" panose="020B0604020202020204" pitchFamily="34" charset="0"/>
+              </a:defRPr>
+            </a:lvl7pPr>
+            <a:lvl8pPr marL="3429000" indent="-228600" eaLnBrk="0" fontAlgn="base" hangingPunct="0">
+              <a:spcBef>
+                <a:spcPct val="0"/>
+              </a:spcBef>
+              <a:spcAft>
+                <a:spcPct val="0"/>
+              </a:spcAft>
+              <a:defRPr>
+                <a:solidFill>
+                  <a:schemeClr val="tx1"/>
+                </a:solidFill>
+                <a:latin typeface="Tahoma" panose="020B0604030504040204" pitchFamily="34" charset="0"/>
+                <a:cs typeface="Arial" panose="020B0604020202020204" pitchFamily="34" charset="0"/>
+              </a:defRPr>
+            </a:lvl8pPr>
+            <a:lvl9pPr marL="3886200" indent="-228600" eaLnBrk="0" fontAlgn="base" hangingPunct="0">
+              <a:spcBef>
+                <a:spcPct val="0"/>
+              </a:spcBef>
+              <a:spcAft>
+                <a:spcPct val="0"/>
+              </a:spcAft>
+              <a:defRPr>
+                <a:solidFill>
+                  <a:schemeClr val="tx1"/>
+                </a:solidFill>
+                <a:latin typeface="Tahoma" panose="020B0604030504040204" pitchFamily="34" charset="0"/>
+                <a:cs typeface="Arial" panose="020B0604020202020204" pitchFamily="34" charset="0"/>
+              </a:defRPr>
+            </a:lvl9pPr>
+          </a:lstStyle>
+          <a:p>
+            <a:pPr algn="ctr" eaLnBrk="1" hangingPunct="1"/>
+            <a:r>
+              <a:rPr lang="en-US" altLang="en-US" sz="1467" dirty="0">
+                <a:solidFill>
+                  <a:sysClr val="windowText" lastClr="000000"/>
+                </a:solidFill>
+                <a:latin typeface="+mn-lt"/>
+              </a:rPr>
+              <a:t>Sort</a:t>
+            </a:r>
+          </a:p>
+        </p:txBody>
+      </p:sp>
+      <p:sp>
+        <p:nvSpPr>
+          <p:cNvPr id="28" name="Rectangle 27">
+            <a:extLst>
+              <a:ext uri="{FF2B5EF4-FFF2-40B4-BE49-F238E27FC236}">
+                <a16:creationId xmlns:a16="http://schemas.microsoft.com/office/drawing/2014/main" id="{B2CCA4FC-6A6E-4B57-9804-070EF37A3BA3}"/>
+              </a:ext>
+            </a:extLst>
+          </p:cNvPr>
+          <p:cNvSpPr/>
+          <p:nvPr/>
+        </p:nvSpPr>
+        <p:spPr>
+          <a:xfrm>
+            <a:off x="189489" y="2233664"/>
+            <a:ext cx="1406313" cy="669636"/>
+          </a:xfrm>
+          <a:prstGeom prst="rect">
+            <a:avLst/>
+          </a:prstGeom>
+        </p:spPr>
+        <p:style>
+          <a:lnRef idx="2">
+            <a:schemeClr val="dk1">
+              <a:shade val="50000"/>
+            </a:schemeClr>
+          </a:lnRef>
+          <a:fillRef idx="1">
+            <a:schemeClr val="dk1"/>
+          </a:fillRef>
+          <a:effectRef idx="0">
+            <a:schemeClr val="dk1"/>
+          </a:effectRef>
+          <a:fontRef idx="minor">
+            <a:schemeClr val="lt1"/>
+          </a:fontRef>
+        </p:style>
+        <p:txBody>
+          <a:bodyPr rtlCol="0" anchor="ctr"/>
+          <a:lstStyle/>
+          <a:p>
+            <a:pPr algn="ctr"/>
+            <a:r>
+              <a:rPr lang="en-US" sz="1467" dirty="0"/>
+              <a:t>FROM</a:t>
+            </a:r>
+          </a:p>
+        </p:txBody>
+      </p:sp>
+      <p:sp>
+        <p:nvSpPr>
+          <p:cNvPr id="29" name="Text Box 7">
+            <a:extLst>
+              <a:ext uri="{FF2B5EF4-FFF2-40B4-BE49-F238E27FC236}">
+                <a16:creationId xmlns:a16="http://schemas.microsoft.com/office/drawing/2014/main" id="{83FA6580-DD1A-43B8-B17B-83E0D4E58193}"/>
+              </a:ext>
+            </a:extLst>
+          </p:cNvPr>
+          <p:cNvSpPr txBox="1">
+            <a:spLocks noChangeArrowheads="1"/>
+          </p:cNvSpPr>
+          <p:nvPr/>
+        </p:nvSpPr>
+        <p:spPr bwMode="auto">
+          <a:xfrm>
+            <a:off x="212755" y="1867398"/>
+            <a:ext cx="1402080" cy="318100"/>
+          </a:xfrm>
+          <a:prstGeom prst="rect">
+            <a:avLst/>
+          </a:prstGeom>
+          <a:noFill/>
+          <a:ln>
+            <a:noFill/>
+          </a:ln>
+          <a:extLst>
+            <a:ext uri="{909E8E84-426E-40DD-AFC4-6F175D3DCCD1}">
+              <a14:hiddenFill xmlns:a14="http://schemas.microsoft.com/office/drawing/2010/main">
+                <a:solidFill>
+                  <a:srgbClr val="FFFFFF"/>
+                </a:solidFill>
+              </a14:hiddenFill>
+            </a:ext>
+            <a:ext uri="{91240B29-F687-4F45-9708-019B960494DF}">
+              <a14:hiddenLine xmlns:a14="http://schemas.microsoft.com/office/drawing/2010/main" w="28575">
+                <a:solidFill>
+                  <a:srgbClr val="000000"/>
+                </a:solidFill>
+                <a:miter lim="800000"/>
+                <a:headEnd/>
+                <a:tailEnd/>
+              </a14:hiddenLine>
+            </a:ext>
+          </a:extLst>
+        </p:spPr>
+        <p:txBody>
+          <a:bodyPr wrap="square">
+            <a:spAutoFit/>
+          </a:bodyPr>
+          <a:lstStyle>
+            <a:lvl1pPr eaLnBrk="0" hangingPunct="0">
+              <a:defRPr>
+                <a:solidFill>
+                  <a:schemeClr val="tx1"/>
+                </a:solidFill>
+                <a:latin typeface="Tahoma" panose="020B0604030504040204" pitchFamily="34" charset="0"/>
+                <a:cs typeface="Arial" panose="020B0604020202020204" pitchFamily="34" charset="0"/>
+              </a:defRPr>
+            </a:lvl1pPr>
+            <a:lvl2pPr marL="742950" indent="-285750" eaLnBrk="0" hangingPunct="0">
+              <a:defRPr>
+                <a:solidFill>
+                  <a:schemeClr val="tx1"/>
+                </a:solidFill>
+                <a:latin typeface="Tahoma" panose="020B0604030504040204" pitchFamily="34" charset="0"/>
+                <a:cs typeface="Arial" panose="020B0604020202020204" pitchFamily="34" charset="0"/>
+              </a:defRPr>
+            </a:lvl2pPr>
+            <a:lvl3pPr marL="1143000" indent="-228600" eaLnBrk="0" hangingPunct="0">
+              <a:defRPr>
+                <a:solidFill>
+                  <a:schemeClr val="tx1"/>
+                </a:solidFill>
+                <a:latin typeface="Tahoma" panose="020B0604030504040204" pitchFamily="34" charset="0"/>
+                <a:cs typeface="Arial" panose="020B0604020202020204" pitchFamily="34" charset="0"/>
+              </a:defRPr>
+            </a:lvl3pPr>
+            <a:lvl4pPr marL="1600200" indent="-228600" eaLnBrk="0" hangingPunct="0">
+              <a:defRPr>
+                <a:solidFill>
+                  <a:schemeClr val="tx1"/>
+                </a:solidFill>
+                <a:latin typeface="Tahoma" panose="020B0604030504040204" pitchFamily="34" charset="0"/>
+                <a:cs typeface="Arial" panose="020B0604020202020204" pitchFamily="34" charset="0"/>
+              </a:defRPr>
+            </a:lvl4pPr>
+            <a:lvl5pPr marL="2057400" indent="-228600" eaLnBrk="0" hangingPunct="0">
+              <a:defRPr>
+                <a:solidFill>
+                  <a:schemeClr val="tx1"/>
+                </a:solidFill>
+                <a:latin typeface="Tahoma" panose="020B0604030504040204" pitchFamily="34" charset="0"/>
+                <a:cs typeface="Arial" panose="020B0604020202020204" pitchFamily="34" charset="0"/>
+              </a:defRPr>
+            </a:lvl5pPr>
+            <a:lvl6pPr marL="2514600" indent="-228600" eaLnBrk="0" fontAlgn="base" hangingPunct="0">
+              <a:spcBef>
+                <a:spcPct val="0"/>
+              </a:spcBef>
+              <a:spcAft>
+                <a:spcPct val="0"/>
+              </a:spcAft>
+              <a:defRPr>
+                <a:solidFill>
+                  <a:schemeClr val="tx1"/>
+                </a:solidFill>
+                <a:latin typeface="Tahoma" panose="020B0604030504040204" pitchFamily="34" charset="0"/>
+                <a:cs typeface="Arial" panose="020B0604020202020204" pitchFamily="34" charset="0"/>
+              </a:defRPr>
+            </a:lvl6pPr>
+            <a:lvl7pPr marL="2971800" indent="-228600" eaLnBrk="0" fontAlgn="base" hangingPunct="0">
+              <a:spcBef>
+                <a:spcPct val="0"/>
+              </a:spcBef>
+              <a:spcAft>
+                <a:spcPct val="0"/>
+              </a:spcAft>
+              <a:defRPr>
+                <a:solidFill>
+                  <a:schemeClr val="tx1"/>
+                </a:solidFill>
+                <a:latin typeface="Tahoma" panose="020B0604030504040204" pitchFamily="34" charset="0"/>
+                <a:cs typeface="Arial" panose="020B0604020202020204" pitchFamily="34" charset="0"/>
+              </a:defRPr>
+            </a:lvl7pPr>
+            <a:lvl8pPr marL="3429000" indent="-228600" eaLnBrk="0" fontAlgn="base" hangingPunct="0">
+              <a:spcBef>
+                <a:spcPct val="0"/>
+              </a:spcBef>
+              <a:spcAft>
+                <a:spcPct val="0"/>
+              </a:spcAft>
+              <a:defRPr>
+                <a:solidFill>
+                  <a:schemeClr val="tx1"/>
+                </a:solidFill>
+                <a:latin typeface="Tahoma" panose="020B0604030504040204" pitchFamily="34" charset="0"/>
+                <a:cs typeface="Arial" panose="020B0604020202020204" pitchFamily="34" charset="0"/>
+              </a:defRPr>
+            </a:lvl8pPr>
+            <a:lvl9pPr marL="3886200" indent="-228600" eaLnBrk="0" fontAlgn="base" hangingPunct="0">
+              <a:spcBef>
+                <a:spcPct val="0"/>
+              </a:spcBef>
+              <a:spcAft>
+                <a:spcPct val="0"/>
+              </a:spcAft>
+              <a:defRPr>
+                <a:solidFill>
+                  <a:schemeClr val="tx1"/>
+                </a:solidFill>
+                <a:latin typeface="Tahoma" panose="020B0604030504040204" pitchFamily="34" charset="0"/>
+                <a:cs typeface="Arial" panose="020B0604020202020204" pitchFamily="34" charset="0"/>
+              </a:defRPr>
+            </a:lvl9pPr>
+          </a:lstStyle>
+          <a:p>
+            <a:pPr algn="ctr" eaLnBrk="1" hangingPunct="1"/>
+            <a:r>
+              <a:rPr lang="en-US" altLang="en-US" sz="1467" dirty="0">
+                <a:solidFill>
+                  <a:sysClr val="windowText" lastClr="000000"/>
+                </a:solidFill>
+                <a:latin typeface="+mn-lt"/>
+              </a:rPr>
+              <a:t>Tables</a:t>
+            </a:r>
+          </a:p>
+        </p:txBody>
+      </p:sp>
+      <p:sp>
+        <p:nvSpPr>
+          <p:cNvPr id="30" name="Text Box 7">
+            <a:extLst>
+              <a:ext uri="{FF2B5EF4-FFF2-40B4-BE49-F238E27FC236}">
+                <a16:creationId xmlns:a16="http://schemas.microsoft.com/office/drawing/2014/main" id="{06F70745-8ED6-455A-8807-02183A62CD78}"/>
+              </a:ext>
+            </a:extLst>
+          </p:cNvPr>
+          <p:cNvSpPr txBox="1">
+            <a:spLocks noChangeArrowheads="1"/>
+          </p:cNvSpPr>
+          <p:nvPr/>
+        </p:nvSpPr>
+        <p:spPr bwMode="auto">
+          <a:xfrm>
+            <a:off x="7131530" y="1865802"/>
+            <a:ext cx="1402080" cy="318100"/>
+          </a:xfrm>
+          <a:prstGeom prst="rect">
+            <a:avLst/>
+          </a:prstGeom>
+          <a:noFill/>
+          <a:ln>
+            <a:noFill/>
+          </a:ln>
+          <a:extLst>
+            <a:ext uri="{909E8E84-426E-40DD-AFC4-6F175D3DCCD1}">
+              <a14:hiddenFill xmlns:a14="http://schemas.microsoft.com/office/drawing/2010/main">
+                <a:solidFill>
+                  <a:srgbClr val="FFFFFF"/>
+                </a:solidFill>
+              </a14:hiddenFill>
+            </a:ext>
+            <a:ext uri="{91240B29-F687-4F45-9708-019B960494DF}">
+              <a14:hiddenLine xmlns:a14="http://schemas.microsoft.com/office/drawing/2010/main" w="28575">
+                <a:solidFill>
+                  <a:srgbClr val="000000"/>
+                </a:solidFill>
+                <a:miter lim="800000"/>
+                <a:headEnd/>
+                <a:tailEnd/>
+              </a14:hiddenLine>
+            </a:ext>
+          </a:extLst>
+        </p:spPr>
+        <p:txBody>
+          <a:bodyPr wrap="square">
+            <a:spAutoFit/>
+          </a:bodyPr>
+          <a:lstStyle>
+            <a:lvl1pPr eaLnBrk="0" hangingPunct="0">
+              <a:defRPr>
+                <a:solidFill>
+                  <a:schemeClr val="tx1"/>
+                </a:solidFill>
+                <a:latin typeface="Tahoma" panose="020B0604030504040204" pitchFamily="34" charset="0"/>
+                <a:cs typeface="Arial" panose="020B0604020202020204" pitchFamily="34" charset="0"/>
+              </a:defRPr>
+            </a:lvl1pPr>
+            <a:lvl2pPr marL="742950" indent="-285750" eaLnBrk="0" hangingPunct="0">
+              <a:defRPr>
+                <a:solidFill>
+                  <a:schemeClr val="tx1"/>
+                </a:solidFill>
+                <a:latin typeface="Tahoma" panose="020B0604030504040204" pitchFamily="34" charset="0"/>
+                <a:cs typeface="Arial" panose="020B0604020202020204" pitchFamily="34" charset="0"/>
+              </a:defRPr>
+            </a:lvl2pPr>
+            <a:lvl3pPr marL="1143000" indent="-228600" eaLnBrk="0" hangingPunct="0">
+              <a:defRPr>
+                <a:solidFill>
+                  <a:schemeClr val="tx1"/>
+                </a:solidFill>
+                <a:latin typeface="Tahoma" panose="020B0604030504040204" pitchFamily="34" charset="0"/>
+                <a:cs typeface="Arial" panose="020B0604020202020204" pitchFamily="34" charset="0"/>
+              </a:defRPr>
+            </a:lvl3pPr>
+            <a:lvl4pPr marL="1600200" indent="-228600" eaLnBrk="0" hangingPunct="0">
+              <a:defRPr>
+                <a:solidFill>
+                  <a:schemeClr val="tx1"/>
+                </a:solidFill>
+                <a:latin typeface="Tahoma" panose="020B0604030504040204" pitchFamily="34" charset="0"/>
+                <a:cs typeface="Arial" panose="020B0604020202020204" pitchFamily="34" charset="0"/>
+              </a:defRPr>
+            </a:lvl4pPr>
+            <a:lvl5pPr marL="2057400" indent="-228600" eaLnBrk="0" hangingPunct="0">
+              <a:defRPr>
+                <a:solidFill>
+                  <a:schemeClr val="tx1"/>
+                </a:solidFill>
+                <a:latin typeface="Tahoma" panose="020B0604030504040204" pitchFamily="34" charset="0"/>
+                <a:cs typeface="Arial" panose="020B0604020202020204" pitchFamily="34" charset="0"/>
+              </a:defRPr>
+            </a:lvl5pPr>
+            <a:lvl6pPr marL="2514600" indent="-228600" eaLnBrk="0" fontAlgn="base" hangingPunct="0">
+              <a:spcBef>
+                <a:spcPct val="0"/>
+              </a:spcBef>
+              <a:spcAft>
+                <a:spcPct val="0"/>
+              </a:spcAft>
+              <a:defRPr>
+                <a:solidFill>
+                  <a:schemeClr val="tx1"/>
+                </a:solidFill>
+                <a:latin typeface="Tahoma" panose="020B0604030504040204" pitchFamily="34" charset="0"/>
+                <a:cs typeface="Arial" panose="020B0604020202020204" pitchFamily="34" charset="0"/>
+              </a:defRPr>
+            </a:lvl6pPr>
+            <a:lvl7pPr marL="2971800" indent="-228600" eaLnBrk="0" fontAlgn="base" hangingPunct="0">
+              <a:spcBef>
+                <a:spcPct val="0"/>
+              </a:spcBef>
+              <a:spcAft>
+                <a:spcPct val="0"/>
+              </a:spcAft>
+              <a:defRPr>
+                <a:solidFill>
+                  <a:schemeClr val="tx1"/>
+                </a:solidFill>
+                <a:latin typeface="Tahoma" panose="020B0604030504040204" pitchFamily="34" charset="0"/>
+                <a:cs typeface="Arial" panose="020B0604020202020204" pitchFamily="34" charset="0"/>
+              </a:defRPr>
+            </a:lvl7pPr>
+            <a:lvl8pPr marL="3429000" indent="-228600" eaLnBrk="0" fontAlgn="base" hangingPunct="0">
+              <a:spcBef>
+                <a:spcPct val="0"/>
+              </a:spcBef>
+              <a:spcAft>
+                <a:spcPct val="0"/>
+              </a:spcAft>
+              <a:defRPr>
+                <a:solidFill>
+                  <a:schemeClr val="tx1"/>
+                </a:solidFill>
+                <a:latin typeface="Tahoma" panose="020B0604030504040204" pitchFamily="34" charset="0"/>
+                <a:cs typeface="Arial" panose="020B0604020202020204" pitchFamily="34" charset="0"/>
+              </a:defRPr>
+            </a:lvl8pPr>
+            <a:lvl9pPr marL="3886200" indent="-228600" eaLnBrk="0" fontAlgn="base" hangingPunct="0">
+              <a:spcBef>
+                <a:spcPct val="0"/>
+              </a:spcBef>
+              <a:spcAft>
+                <a:spcPct val="0"/>
+              </a:spcAft>
+              <a:defRPr>
+                <a:solidFill>
+                  <a:schemeClr val="tx1"/>
+                </a:solidFill>
+                <a:latin typeface="Tahoma" panose="020B0604030504040204" pitchFamily="34" charset="0"/>
+                <a:cs typeface="Arial" panose="020B0604020202020204" pitchFamily="34" charset="0"/>
+              </a:defRPr>
+            </a:lvl9pPr>
+          </a:lstStyle>
+          <a:p>
+            <a:pPr algn="ctr" eaLnBrk="1" hangingPunct="1"/>
+            <a:r>
+              <a:rPr lang="en-US" altLang="en-US" sz="1467" dirty="0">
+                <a:solidFill>
+                  <a:sysClr val="windowText" lastClr="000000"/>
+                </a:solidFill>
+                <a:latin typeface="+mn-lt"/>
+              </a:rPr>
+              <a:t>Columns</a:t>
+            </a:r>
+          </a:p>
+        </p:txBody>
+      </p:sp>
+      <p:sp>
+        <p:nvSpPr>
+          <p:cNvPr id="31" name="Rectangle 30">
+            <a:extLst>
+              <a:ext uri="{FF2B5EF4-FFF2-40B4-BE49-F238E27FC236}">
+                <a16:creationId xmlns:a16="http://schemas.microsoft.com/office/drawing/2014/main" id="{EBF96871-E0E7-412F-9863-36C4F10A263A}"/>
+              </a:ext>
+            </a:extLst>
+          </p:cNvPr>
+          <p:cNvSpPr/>
+          <p:nvPr/>
+        </p:nvSpPr>
+        <p:spPr>
+          <a:xfrm>
+            <a:off x="10596198" y="2233664"/>
+            <a:ext cx="1406313" cy="669636"/>
+          </a:xfrm>
+          <a:prstGeom prst="rect">
+            <a:avLst/>
+          </a:prstGeom>
+        </p:spPr>
+        <p:style>
+          <a:lnRef idx="2">
+            <a:schemeClr val="dk1">
+              <a:shade val="50000"/>
+            </a:schemeClr>
+          </a:lnRef>
+          <a:fillRef idx="1">
+            <a:schemeClr val="dk1"/>
+          </a:fillRef>
+          <a:effectRef idx="0">
+            <a:schemeClr val="dk1"/>
+          </a:effectRef>
+          <a:fontRef idx="minor">
+            <a:schemeClr val="lt1"/>
+          </a:fontRef>
+        </p:style>
+        <p:txBody>
+          <a:bodyPr rtlCol="0" anchor="ctr"/>
+          <a:lstStyle/>
+          <a:p>
+            <a:pPr algn="ctr"/>
+            <a:r>
+              <a:rPr lang="en-US" sz="1467" dirty="0"/>
+              <a:t>Results</a:t>
+            </a:r>
+            <a:endParaRPr lang="en-US" sz="1200" dirty="0"/>
+          </a:p>
+        </p:txBody>
+      </p:sp>
+    </p:spTree>
+    <p:extLst>
+      <p:ext uri="{BB962C8B-B14F-4D97-AF65-F5344CB8AC3E}">
+        <p14:creationId xmlns:p14="http://schemas.microsoft.com/office/powerpoint/2010/main" val="474425672"/>
+      </p:ext>
+    </p:extLst>
+  </p:cSld>
+  <p:clrMapOvr>
+    <a:masterClrMapping/>
+  </p:clrMapOvr>
+  <p:timing>
+    <p:tnLst>
+      <p:par>
+        <p:cTn id="1" dur="indefinite" restart="never" nodeType="tmRoot">
+          <p:childTnLst>
+            <p:seq concurrent="1" nextAc="seek">
+              <p:cTn id="2" dur="indefinite" nodeType="mainSeq">
+                <p:childTnLst>
+                  <p:par>
+                    <p:cTn id="3" fill="hold">
+                      <p:stCondLst>
+                        <p:cond delay="indefinite"/>
+                      </p:stCondLst>
+                      <p:childTnLst>
+                        <p:par>
+                          <p:cTn id="4" fill="hold">
+                            <p:stCondLst>
+                              <p:cond delay="0"/>
+                            </p:stCondLst>
+                            <p:childTnLst>
+                              <p:par>
+                                <p:cTn id="5" presetID="10" presetClass="entr" presetSubtype="0" fill="hold" nodeType="clickEffect">
+                                  <p:stCondLst>
+                                    <p:cond delay="0"/>
+                                  </p:stCondLst>
+                                  <p:childTnLst>
+                                    <p:set>
+                                      <p:cBhvr>
+                                        <p:cTn id="6" dur="1" fill="hold">
+                                          <p:stCondLst>
+                                            <p:cond delay="0"/>
+                                          </p:stCondLst>
+                                        </p:cTn>
+                                        <p:tgtEl>
+                                          <p:spTgt spid="8"/>
+                                        </p:tgtEl>
+                                        <p:attrNameLst>
+                                          <p:attrName>style.visibility</p:attrName>
+                                        </p:attrNameLst>
+                                      </p:cBhvr>
+                                      <p:to>
+                                        <p:strVal val="visible"/>
+                                      </p:to>
+                                    </p:set>
+                                    <p:animEffect transition="in" filter="fade">
+                                      <p:cBhvr>
+                                        <p:cTn id="7" dur="500"/>
+                                        <p:tgtEl>
+                                          <p:spTgt spid="8"/>
+                                        </p:tgtEl>
+                                      </p:cBhvr>
+                                    </p:animEffect>
+                                  </p:childTnLst>
+                                </p:cTn>
+                              </p:par>
+                              <p:par>
+                                <p:cTn id="8" presetID="10" presetClass="entr" presetSubtype="0" fill="hold" grpId="0" nodeType="withEffect">
+                                  <p:stCondLst>
+                                    <p:cond delay="0"/>
+                                  </p:stCondLst>
+                                  <p:childTnLst>
+                                    <p:set>
+                                      <p:cBhvr>
+                                        <p:cTn id="9" dur="1" fill="hold">
+                                          <p:stCondLst>
+                                            <p:cond delay="0"/>
+                                          </p:stCondLst>
+                                        </p:cTn>
+                                        <p:tgtEl>
+                                          <p:spTgt spid="21"/>
+                                        </p:tgtEl>
+                                        <p:attrNameLst>
+                                          <p:attrName>style.visibility</p:attrName>
+                                        </p:attrNameLst>
+                                      </p:cBhvr>
+                                      <p:to>
+                                        <p:strVal val="visible"/>
+                                      </p:to>
+                                    </p:set>
+                                    <p:animEffect transition="in" filter="fade">
+                                      <p:cBhvr>
+                                        <p:cTn id="10" dur="500"/>
+                                        <p:tgtEl>
+                                          <p:spTgt spid="21"/>
+                                        </p:tgtEl>
+                                      </p:cBhvr>
+                                    </p:animEffect>
+                                  </p:childTnLst>
+                                </p:cTn>
+                              </p:par>
+                            </p:childTnLst>
+                          </p:cTn>
+                        </p:par>
+                      </p:childTnLst>
+                    </p:cTn>
+                  </p:par>
+                  <p:par>
+                    <p:cTn id="11" fill="hold">
+                      <p:stCondLst>
+                        <p:cond delay="indefinite"/>
+                      </p:stCondLst>
+                      <p:childTnLst>
+                        <p:par>
+                          <p:cTn id="12" fill="hold">
+                            <p:stCondLst>
+                              <p:cond delay="0"/>
+                            </p:stCondLst>
+                            <p:childTnLst>
+                              <p:par>
+                                <p:cTn id="13" presetID="10" presetClass="entr" presetSubtype="0" fill="hold" nodeType="clickEffect">
+                                  <p:stCondLst>
+                                    <p:cond delay="0"/>
+                                  </p:stCondLst>
+                                  <p:childTnLst>
+                                    <p:set>
+                                      <p:cBhvr>
+                                        <p:cTn id="14" dur="1" fill="hold">
+                                          <p:stCondLst>
+                                            <p:cond delay="0"/>
+                                          </p:stCondLst>
+                                        </p:cTn>
+                                        <p:tgtEl>
+                                          <p:spTgt spid="10"/>
+                                        </p:tgtEl>
+                                        <p:attrNameLst>
+                                          <p:attrName>style.visibility</p:attrName>
+                                        </p:attrNameLst>
+                                      </p:cBhvr>
+                                      <p:to>
+                                        <p:strVal val="visible"/>
+                                      </p:to>
+                                    </p:set>
+                                    <p:animEffect transition="in" filter="fade">
+                                      <p:cBhvr>
+                                        <p:cTn id="15" dur="500"/>
+                                        <p:tgtEl>
+                                          <p:spTgt spid="10"/>
+                                        </p:tgtEl>
+                                      </p:cBhvr>
+                                    </p:animEffect>
+                                  </p:childTnLst>
+                                </p:cTn>
+                              </p:par>
+                            </p:childTnLst>
+                          </p:cTn>
+                        </p:par>
+                      </p:childTnLst>
+                    </p:cTn>
+                  </p:par>
+                  <p:par>
+                    <p:cTn id="16" fill="hold">
+                      <p:stCondLst>
+                        <p:cond delay="indefinite"/>
+                      </p:stCondLst>
+                      <p:childTnLst>
+                        <p:par>
+                          <p:cTn id="17" fill="hold">
+                            <p:stCondLst>
+                              <p:cond delay="0"/>
+                            </p:stCondLst>
+                            <p:childTnLst>
+                              <p:par>
+                                <p:cTn id="18" presetID="10" presetClass="entr" presetSubtype="0" fill="hold" nodeType="clickEffect">
+                                  <p:stCondLst>
+                                    <p:cond delay="0"/>
+                                  </p:stCondLst>
+                                  <p:childTnLst>
+                                    <p:set>
+                                      <p:cBhvr>
+                                        <p:cTn id="19" dur="1" fill="hold">
+                                          <p:stCondLst>
+                                            <p:cond delay="0"/>
+                                          </p:stCondLst>
+                                        </p:cTn>
+                                        <p:tgtEl>
+                                          <p:spTgt spid="12"/>
+                                        </p:tgtEl>
+                                        <p:attrNameLst>
+                                          <p:attrName>style.visibility</p:attrName>
+                                        </p:attrNameLst>
+                                      </p:cBhvr>
+                                      <p:to>
+                                        <p:strVal val="visible"/>
+                                      </p:to>
+                                    </p:set>
+                                    <p:animEffect transition="in" filter="fade">
+                                      <p:cBhvr>
+                                        <p:cTn id="20" dur="500"/>
+                                        <p:tgtEl>
+                                          <p:spTgt spid="12"/>
+                                        </p:tgtEl>
+                                      </p:cBhvr>
+                                    </p:animEffect>
+                                  </p:childTnLst>
+                                </p:cTn>
+                              </p:par>
+                              <p:par>
+                                <p:cTn id="21" presetID="10" presetClass="entr" presetSubtype="0" fill="hold" grpId="0" nodeType="withEffect">
+                                  <p:stCondLst>
+                                    <p:cond delay="0"/>
+                                  </p:stCondLst>
+                                  <p:childTnLst>
+                                    <p:set>
+                                      <p:cBhvr>
+                                        <p:cTn id="22" dur="1" fill="hold">
+                                          <p:stCondLst>
+                                            <p:cond delay="0"/>
+                                          </p:stCondLst>
+                                        </p:cTn>
+                                        <p:tgtEl>
+                                          <p:spTgt spid="18"/>
+                                        </p:tgtEl>
+                                        <p:attrNameLst>
+                                          <p:attrName>style.visibility</p:attrName>
+                                        </p:attrNameLst>
+                                      </p:cBhvr>
+                                      <p:to>
+                                        <p:strVal val="visible"/>
+                                      </p:to>
+                                    </p:set>
+                                    <p:animEffect transition="in" filter="fade">
+                                      <p:cBhvr>
+                                        <p:cTn id="23" dur="500"/>
+                                        <p:tgtEl>
+                                          <p:spTgt spid="18"/>
+                                        </p:tgtEl>
+                                      </p:cBhvr>
+                                    </p:animEffect>
+                                  </p:childTnLst>
+                                </p:cTn>
+                              </p:par>
+                            </p:childTnLst>
+                          </p:cTn>
+                        </p:par>
+                      </p:childTnLst>
+                    </p:cTn>
+                  </p:par>
+                  <p:par>
+                    <p:cTn id="24" fill="hold">
+                      <p:stCondLst>
+                        <p:cond delay="indefinite"/>
+                      </p:stCondLst>
+                      <p:childTnLst>
+                        <p:par>
+                          <p:cTn id="25" fill="hold">
+                            <p:stCondLst>
+                              <p:cond delay="0"/>
+                            </p:stCondLst>
+                            <p:childTnLst>
+                              <p:par>
+                                <p:cTn id="26" presetID="10" presetClass="entr" presetSubtype="0" fill="hold" nodeType="clickEffect">
+                                  <p:stCondLst>
+                                    <p:cond delay="0"/>
+                                  </p:stCondLst>
+                                  <p:childTnLst>
+                                    <p:set>
+                                      <p:cBhvr>
+                                        <p:cTn id="27" dur="1" fill="hold">
+                                          <p:stCondLst>
+                                            <p:cond delay="0"/>
+                                          </p:stCondLst>
+                                        </p:cTn>
+                                        <p:tgtEl>
+                                          <p:spTgt spid="11"/>
+                                        </p:tgtEl>
+                                        <p:attrNameLst>
+                                          <p:attrName>style.visibility</p:attrName>
+                                        </p:attrNameLst>
+                                      </p:cBhvr>
+                                      <p:to>
+                                        <p:strVal val="visible"/>
+                                      </p:to>
+                                    </p:set>
+                                    <p:animEffect transition="in" filter="fade">
+                                      <p:cBhvr>
+                                        <p:cTn id="28" dur="500"/>
+                                        <p:tgtEl>
+                                          <p:spTgt spid="11"/>
+                                        </p:tgtEl>
+                                      </p:cBhvr>
+                                    </p:animEffect>
+                                  </p:childTnLst>
+                                </p:cTn>
+                              </p:par>
+                            </p:childTnLst>
+                          </p:cTn>
+                        </p:par>
+                      </p:childTnLst>
+                    </p:cTn>
+                  </p:par>
+                  <p:par>
+                    <p:cTn id="29" fill="hold">
+                      <p:stCondLst>
+                        <p:cond delay="indefinite"/>
+                      </p:stCondLst>
+                      <p:childTnLst>
+                        <p:par>
+                          <p:cTn id="30" fill="hold">
+                            <p:stCondLst>
+                              <p:cond delay="0"/>
+                            </p:stCondLst>
+                            <p:childTnLst>
+                              <p:par>
+                                <p:cTn id="31" presetID="10" presetClass="entr" presetSubtype="0" fill="hold" nodeType="clickEffect">
+                                  <p:stCondLst>
+                                    <p:cond delay="0"/>
+                                  </p:stCondLst>
+                                  <p:childTnLst>
+                                    <p:set>
+                                      <p:cBhvr>
+                                        <p:cTn id="32" dur="1" fill="hold">
+                                          <p:stCondLst>
+                                            <p:cond delay="0"/>
+                                          </p:stCondLst>
+                                        </p:cTn>
+                                        <p:tgtEl>
+                                          <p:spTgt spid="13"/>
+                                        </p:tgtEl>
+                                        <p:attrNameLst>
+                                          <p:attrName>style.visibility</p:attrName>
+                                        </p:attrNameLst>
+                                      </p:cBhvr>
+                                      <p:to>
+                                        <p:strVal val="visible"/>
+                                      </p:to>
+                                    </p:set>
+                                    <p:animEffect transition="in" filter="fade">
+                                      <p:cBhvr>
+                                        <p:cTn id="33" dur="500"/>
+                                        <p:tgtEl>
+                                          <p:spTgt spid="13"/>
+                                        </p:tgtEl>
+                                      </p:cBhvr>
+                                    </p:animEffect>
+                                  </p:childTnLst>
+                                </p:cTn>
+                              </p:par>
+                              <p:par>
+                                <p:cTn id="34" presetID="10" presetClass="entr" presetSubtype="0" fill="hold" nodeType="withEffect">
+                                  <p:stCondLst>
+                                    <p:cond delay="0"/>
+                                  </p:stCondLst>
+                                  <p:childTnLst>
+                                    <p:set>
+                                      <p:cBhvr>
+                                        <p:cTn id="35" dur="1" fill="hold">
+                                          <p:stCondLst>
+                                            <p:cond delay="0"/>
+                                          </p:stCondLst>
+                                        </p:cTn>
+                                        <p:tgtEl>
+                                          <p:spTgt spid="7"/>
+                                        </p:tgtEl>
+                                        <p:attrNameLst>
+                                          <p:attrName>style.visibility</p:attrName>
+                                        </p:attrNameLst>
+                                      </p:cBhvr>
+                                      <p:to>
+                                        <p:strVal val="visible"/>
+                                      </p:to>
+                                    </p:set>
+                                    <p:animEffect transition="in" filter="fade">
+                                      <p:cBhvr>
+                                        <p:cTn id="36" dur="500"/>
+                                        <p:tgtEl>
+                                          <p:spTgt spid="7"/>
+                                        </p:tgtEl>
+                                      </p:cBhvr>
+                                    </p:animEffect>
+                                  </p:childTnLst>
+                                </p:cTn>
+                              </p:par>
+                              <p:par>
+                                <p:cTn id="37" presetID="10" presetClass="entr" presetSubtype="0" fill="hold" grpId="0" nodeType="withEffect">
+                                  <p:stCondLst>
+                                    <p:cond delay="0"/>
+                                  </p:stCondLst>
+                                  <p:childTnLst>
+                                    <p:set>
+                                      <p:cBhvr>
+                                        <p:cTn id="38" dur="1" fill="hold">
+                                          <p:stCondLst>
+                                            <p:cond delay="0"/>
+                                          </p:stCondLst>
+                                        </p:cTn>
+                                        <p:tgtEl>
+                                          <p:spTgt spid="19"/>
+                                        </p:tgtEl>
+                                        <p:attrNameLst>
+                                          <p:attrName>style.visibility</p:attrName>
+                                        </p:attrNameLst>
+                                      </p:cBhvr>
+                                      <p:to>
+                                        <p:strVal val="visible"/>
+                                      </p:to>
+                                    </p:set>
+                                    <p:animEffect transition="in" filter="fade">
+                                      <p:cBhvr>
+                                        <p:cTn id="39" dur="500"/>
+                                        <p:tgtEl>
+                                          <p:spTgt spid="19"/>
+                                        </p:tgtEl>
+                                      </p:cBhvr>
+                                    </p:animEffect>
+                                  </p:childTnLst>
+                                </p:cTn>
+                              </p:par>
+                            </p:childTnLst>
+                          </p:cTn>
+                        </p:par>
+                      </p:childTnLst>
+                    </p:cTn>
+                  </p:par>
+                  <p:par>
+                    <p:cTn id="40" fill="hold">
+                      <p:stCondLst>
+                        <p:cond delay="indefinite"/>
+                      </p:stCondLst>
+                      <p:childTnLst>
+                        <p:par>
+                          <p:cTn id="41" fill="hold">
+                            <p:stCondLst>
+                              <p:cond delay="0"/>
+                            </p:stCondLst>
+                            <p:childTnLst>
+                              <p:par>
+                                <p:cTn id="42" presetID="10" presetClass="entr" presetSubtype="0" fill="hold" nodeType="clickEffect">
+                                  <p:stCondLst>
+                                    <p:cond delay="0"/>
+                                  </p:stCondLst>
+                                  <p:childTnLst>
+                                    <p:set>
+                                      <p:cBhvr>
+                                        <p:cTn id="43" dur="1" fill="hold">
+                                          <p:stCondLst>
+                                            <p:cond delay="0"/>
+                                          </p:stCondLst>
+                                        </p:cTn>
+                                        <p:tgtEl>
+                                          <p:spTgt spid="16"/>
+                                        </p:tgtEl>
+                                        <p:attrNameLst>
+                                          <p:attrName>style.visibility</p:attrName>
+                                        </p:attrNameLst>
+                                      </p:cBhvr>
+                                      <p:to>
+                                        <p:strVal val="visible"/>
+                                      </p:to>
+                                    </p:set>
+                                    <p:animEffect transition="in" filter="fade">
+                                      <p:cBhvr>
+                                        <p:cTn id="44" dur="500"/>
+                                        <p:tgtEl>
+                                          <p:spTgt spid="16"/>
+                                        </p:tgtEl>
+                                      </p:cBhvr>
+                                    </p:animEffect>
+                                  </p:childTnLst>
+                                </p:cTn>
+                              </p:par>
+                            </p:childTnLst>
+                          </p:cTn>
+                        </p:par>
+                      </p:childTnLst>
+                    </p:cTn>
+                  </p:par>
+                  <p:par>
+                    <p:cTn id="45" fill="hold">
+                      <p:stCondLst>
+                        <p:cond delay="indefinite"/>
+                      </p:stCondLst>
+                      <p:childTnLst>
+                        <p:par>
+                          <p:cTn id="46" fill="hold">
+                            <p:stCondLst>
+                              <p:cond delay="0"/>
+                            </p:stCondLst>
+                            <p:childTnLst>
+                              <p:par>
+                                <p:cTn id="47" presetID="10" presetClass="entr" presetSubtype="0" fill="hold" nodeType="clickEffect">
+                                  <p:stCondLst>
+                                    <p:cond delay="0"/>
+                                  </p:stCondLst>
+                                  <p:childTnLst>
+                                    <p:set>
+                                      <p:cBhvr>
+                                        <p:cTn id="48" dur="1" fill="hold">
+                                          <p:stCondLst>
+                                            <p:cond delay="0"/>
+                                          </p:stCondLst>
+                                        </p:cTn>
+                                        <p:tgtEl>
+                                          <p:spTgt spid="5"/>
+                                        </p:tgtEl>
+                                        <p:attrNameLst>
+                                          <p:attrName>style.visibility</p:attrName>
+                                        </p:attrNameLst>
+                                      </p:cBhvr>
+                                      <p:to>
+                                        <p:strVal val="visible"/>
+                                      </p:to>
+                                    </p:set>
+                                    <p:animEffect transition="in" filter="fade">
+                                      <p:cBhvr>
+                                        <p:cTn id="49" dur="500"/>
+                                        <p:tgtEl>
+                                          <p:spTgt spid="5"/>
+                                        </p:tgtEl>
+                                      </p:cBhvr>
+                                    </p:animEffect>
+                                  </p:childTnLst>
+                                </p:cTn>
+                              </p:par>
+                              <p:par>
+                                <p:cTn id="50" presetID="10" presetClass="entr" presetSubtype="0" fill="hold" grpId="0" nodeType="withEffect">
+                                  <p:stCondLst>
+                                    <p:cond delay="0"/>
+                                  </p:stCondLst>
+                                  <p:childTnLst>
+                                    <p:set>
+                                      <p:cBhvr>
+                                        <p:cTn id="51" dur="1" fill="hold">
+                                          <p:stCondLst>
+                                            <p:cond delay="0"/>
+                                          </p:stCondLst>
+                                        </p:cTn>
+                                        <p:tgtEl>
+                                          <p:spTgt spid="20"/>
+                                        </p:tgtEl>
+                                        <p:attrNameLst>
+                                          <p:attrName>style.visibility</p:attrName>
+                                        </p:attrNameLst>
+                                      </p:cBhvr>
+                                      <p:to>
+                                        <p:strVal val="visible"/>
+                                      </p:to>
+                                    </p:set>
+                                    <p:animEffect transition="in" filter="fade">
+                                      <p:cBhvr>
+                                        <p:cTn id="52" dur="500"/>
+                                        <p:tgtEl>
+                                          <p:spTgt spid="20"/>
+                                        </p:tgtEl>
+                                      </p:cBhvr>
+                                    </p:animEffect>
+                                  </p:childTnLst>
+                                </p:cTn>
+                              </p:par>
+                            </p:childTnLst>
+                          </p:cTn>
+                        </p:par>
+                      </p:childTnLst>
+                    </p:cTn>
+                  </p:par>
+                  <p:par>
+                    <p:cTn id="53" fill="hold">
+                      <p:stCondLst>
+                        <p:cond delay="indefinite"/>
+                      </p:stCondLst>
+                      <p:childTnLst>
+                        <p:par>
+                          <p:cTn id="54" fill="hold">
+                            <p:stCondLst>
+                              <p:cond delay="0"/>
+                            </p:stCondLst>
+                            <p:childTnLst>
+                              <p:par>
+                                <p:cTn id="55" presetID="10" presetClass="entr" presetSubtype="0" fill="hold" nodeType="clickEffect">
+                                  <p:stCondLst>
+                                    <p:cond delay="0"/>
+                                  </p:stCondLst>
+                                  <p:childTnLst>
+                                    <p:set>
+                                      <p:cBhvr>
+                                        <p:cTn id="56" dur="1" fill="hold">
+                                          <p:stCondLst>
+                                            <p:cond delay="0"/>
+                                          </p:stCondLst>
+                                        </p:cTn>
+                                        <p:tgtEl>
+                                          <p:spTgt spid="17"/>
+                                        </p:tgtEl>
+                                        <p:attrNameLst>
+                                          <p:attrName>style.visibility</p:attrName>
+                                        </p:attrNameLst>
+                                      </p:cBhvr>
+                                      <p:to>
+                                        <p:strVal val="visible"/>
+                                      </p:to>
+                                    </p:set>
+                                    <p:animEffect transition="in" filter="fade">
+                                      <p:cBhvr>
+                                        <p:cTn id="57" dur="500"/>
+                                        <p:tgtEl>
+                                          <p:spTgt spid="17"/>
+                                        </p:tgtEl>
+                                      </p:cBhvr>
+                                    </p:animEffect>
+                                  </p:childTnLst>
+                                </p:cTn>
+                              </p:par>
+                            </p:childTnLst>
+                          </p:cTn>
+                        </p:par>
+                      </p:childTnLst>
+                    </p:cTn>
+                  </p:par>
+                  <p:par>
+                    <p:cTn id="58" fill="hold">
+                      <p:stCondLst>
+                        <p:cond delay="indefinite"/>
+                      </p:stCondLst>
+                      <p:childTnLst>
+                        <p:par>
+                          <p:cTn id="59" fill="hold">
+                            <p:stCondLst>
+                              <p:cond delay="0"/>
+                            </p:stCondLst>
+                            <p:childTnLst>
+                              <p:par>
+                                <p:cTn id="60" presetID="10" presetClass="entr" presetSubtype="0" fill="hold" grpId="0" nodeType="clickEffect">
+                                  <p:stCondLst>
+                                    <p:cond delay="0"/>
+                                  </p:stCondLst>
+                                  <p:childTnLst>
+                                    <p:set>
+                                      <p:cBhvr>
+                                        <p:cTn id="61" dur="1" fill="hold">
+                                          <p:stCondLst>
+                                            <p:cond delay="0"/>
+                                          </p:stCondLst>
+                                        </p:cTn>
+                                        <p:tgtEl>
+                                          <p:spTgt spid="23"/>
+                                        </p:tgtEl>
+                                        <p:attrNameLst>
+                                          <p:attrName>style.visibility</p:attrName>
+                                        </p:attrNameLst>
+                                      </p:cBhvr>
+                                      <p:to>
+                                        <p:strVal val="visible"/>
+                                      </p:to>
+                                    </p:set>
+                                    <p:animEffect transition="in" filter="fade">
+                                      <p:cBhvr>
+                                        <p:cTn id="62" dur="500"/>
+                                        <p:tgtEl>
+                                          <p:spTgt spid="23"/>
+                                        </p:tgtEl>
+                                      </p:cBhvr>
+                                    </p:animEffect>
+                                  </p:childTnLst>
+                                </p:cTn>
+                              </p:par>
+                              <p:par>
+                                <p:cTn id="63" presetID="10" presetClass="entr" presetSubtype="0" fill="hold" grpId="0" nodeType="withEffect">
+                                  <p:stCondLst>
+                                    <p:cond delay="0"/>
+                                  </p:stCondLst>
+                                  <p:childTnLst>
+                                    <p:set>
+                                      <p:cBhvr>
+                                        <p:cTn id="64" dur="1" fill="hold">
+                                          <p:stCondLst>
+                                            <p:cond delay="0"/>
+                                          </p:stCondLst>
+                                        </p:cTn>
+                                        <p:tgtEl>
+                                          <p:spTgt spid="24"/>
+                                        </p:tgtEl>
+                                        <p:attrNameLst>
+                                          <p:attrName>style.visibility</p:attrName>
+                                        </p:attrNameLst>
+                                      </p:cBhvr>
+                                      <p:to>
+                                        <p:strVal val="visible"/>
+                                      </p:to>
+                                    </p:set>
+                                    <p:animEffect transition="in" filter="fade">
+                                      <p:cBhvr>
+                                        <p:cTn id="65" dur="500"/>
+                                        <p:tgtEl>
+                                          <p:spTgt spid="24"/>
+                                        </p:tgtEl>
+                                      </p:cBhvr>
+                                    </p:animEffect>
+                                  </p:childTnLst>
+                                </p:cTn>
+                              </p:par>
+                            </p:childTnLst>
+                          </p:cTn>
+                        </p:par>
+                      </p:childTnLst>
+                    </p:cTn>
+                  </p:par>
+                  <p:par>
+                    <p:cTn id="66" fill="hold">
+                      <p:stCondLst>
+                        <p:cond delay="indefinite"/>
+                      </p:stCondLst>
+                      <p:childTnLst>
+                        <p:par>
+                          <p:cTn id="67" fill="hold">
+                            <p:stCondLst>
+                              <p:cond delay="0"/>
+                            </p:stCondLst>
+                            <p:childTnLst>
+                              <p:par>
+                                <p:cTn id="68" presetID="10" presetClass="entr" presetSubtype="0" fill="hold" nodeType="clickEffect">
+                                  <p:stCondLst>
+                                    <p:cond delay="0"/>
+                                  </p:stCondLst>
+                                  <p:childTnLst>
+                                    <p:set>
+                                      <p:cBhvr>
+                                        <p:cTn id="69" dur="1" fill="hold">
+                                          <p:stCondLst>
+                                            <p:cond delay="0"/>
+                                          </p:stCondLst>
+                                        </p:cTn>
+                                        <p:tgtEl>
+                                          <p:spTgt spid="14"/>
+                                        </p:tgtEl>
+                                        <p:attrNameLst>
+                                          <p:attrName>style.visibility</p:attrName>
+                                        </p:attrNameLst>
+                                      </p:cBhvr>
+                                      <p:to>
+                                        <p:strVal val="visible"/>
+                                      </p:to>
+                                    </p:set>
+                                    <p:animEffect transition="in" filter="fade">
+                                      <p:cBhvr>
+                                        <p:cTn id="70" dur="500"/>
+                                        <p:tgtEl>
+                                          <p:spTgt spid="14"/>
+                                        </p:tgtEl>
+                                      </p:cBhvr>
+                                    </p:animEffect>
+                                  </p:childTnLst>
+                                </p:cTn>
+                              </p:par>
+                              <p:par>
+                                <p:cTn id="71" presetID="10" presetClass="entr" presetSubtype="0" fill="hold" grpId="0" nodeType="withEffect">
+                                  <p:stCondLst>
+                                    <p:cond delay="0"/>
+                                  </p:stCondLst>
+                                  <p:childTnLst>
+                                    <p:set>
+                                      <p:cBhvr>
+                                        <p:cTn id="72" dur="1" fill="hold">
+                                          <p:stCondLst>
+                                            <p:cond delay="0"/>
+                                          </p:stCondLst>
+                                        </p:cTn>
+                                        <p:tgtEl>
+                                          <p:spTgt spid="22"/>
+                                        </p:tgtEl>
+                                        <p:attrNameLst>
+                                          <p:attrName>style.visibility</p:attrName>
+                                        </p:attrNameLst>
+                                      </p:cBhvr>
+                                      <p:to>
+                                        <p:strVal val="visible"/>
+                                      </p:to>
+                                    </p:set>
+                                    <p:animEffect transition="in" filter="fade">
+                                      <p:cBhvr>
+                                        <p:cTn id="73" dur="500"/>
+                                        <p:tgtEl>
+                                          <p:spTgt spid="22"/>
+                                        </p:tgtEl>
+                                      </p:cBhvr>
+                                    </p:animEffect>
+                                  </p:childTnLst>
+                                </p:cTn>
+                              </p:par>
+                              <p:par>
+                                <p:cTn id="74" presetID="10" presetClass="entr" presetSubtype="0" fill="hold" grpId="0" nodeType="withEffect">
+                                  <p:stCondLst>
+                                    <p:cond delay="0"/>
+                                  </p:stCondLst>
+                                  <p:childTnLst>
+                                    <p:set>
+                                      <p:cBhvr>
+                                        <p:cTn id="75" dur="1" fill="hold">
+                                          <p:stCondLst>
+                                            <p:cond delay="0"/>
+                                          </p:stCondLst>
+                                        </p:cTn>
+                                        <p:tgtEl>
+                                          <p:spTgt spid="26"/>
+                                        </p:tgtEl>
+                                        <p:attrNameLst>
+                                          <p:attrName>style.visibility</p:attrName>
+                                        </p:attrNameLst>
+                                      </p:cBhvr>
+                                      <p:to>
+                                        <p:strVal val="visible"/>
+                                      </p:to>
+                                    </p:set>
+                                    <p:animEffect transition="in" filter="fade">
+                                      <p:cBhvr>
+                                        <p:cTn id="76" dur="500"/>
+                                        <p:tgtEl>
+                                          <p:spTgt spid="26"/>
+                                        </p:tgtEl>
+                                      </p:cBhvr>
+                                    </p:animEffect>
+                                  </p:childTnLst>
+                                </p:cTn>
+                              </p:par>
+                              <p:par>
+                                <p:cTn id="77" presetID="10" presetClass="entr" presetSubtype="0" fill="hold" grpId="0" nodeType="withEffect">
+                                  <p:stCondLst>
+                                    <p:cond delay="0"/>
+                                  </p:stCondLst>
+                                  <p:childTnLst>
+                                    <p:set>
+                                      <p:cBhvr>
+                                        <p:cTn id="78" dur="1" fill="hold">
+                                          <p:stCondLst>
+                                            <p:cond delay="0"/>
+                                          </p:stCondLst>
+                                        </p:cTn>
+                                        <p:tgtEl>
+                                          <p:spTgt spid="27"/>
+                                        </p:tgtEl>
+                                        <p:attrNameLst>
+                                          <p:attrName>style.visibility</p:attrName>
+                                        </p:attrNameLst>
+                                      </p:cBhvr>
+                                      <p:to>
+                                        <p:strVal val="visible"/>
+                                      </p:to>
+                                    </p:set>
+                                    <p:animEffect transition="in" filter="fade">
+                                      <p:cBhvr>
+                                        <p:cTn id="79" dur="500"/>
+                                        <p:tgtEl>
+                                          <p:spTgt spid="27"/>
+                                        </p:tgtEl>
+                                      </p:cBhvr>
+                                    </p:animEffect>
+                                  </p:childTnLst>
+                                </p:cTn>
+                              </p:par>
+                            </p:childTnLst>
+                          </p:cTn>
+                        </p:par>
+                      </p:childTnLst>
+                    </p:cTn>
+                  </p:par>
+                  <p:par>
+                    <p:cTn id="80" fill="hold">
+                      <p:stCondLst>
+                        <p:cond delay="indefinite"/>
+                      </p:stCondLst>
+                      <p:childTnLst>
+                        <p:par>
+                          <p:cTn id="81" fill="hold">
+                            <p:stCondLst>
+                              <p:cond delay="0"/>
+                            </p:stCondLst>
+                            <p:childTnLst>
+                              <p:par>
+                                <p:cTn id="82" presetID="10" presetClass="entr" presetSubtype="0" fill="hold" nodeType="clickEffect">
+                                  <p:stCondLst>
+                                    <p:cond delay="0"/>
+                                  </p:stCondLst>
+                                  <p:childTnLst>
+                                    <p:set>
+                                      <p:cBhvr>
+                                        <p:cTn id="83" dur="1" fill="hold">
+                                          <p:stCondLst>
+                                            <p:cond delay="0"/>
+                                          </p:stCondLst>
+                                        </p:cTn>
+                                        <p:tgtEl>
+                                          <p:spTgt spid="15"/>
+                                        </p:tgtEl>
+                                        <p:attrNameLst>
+                                          <p:attrName>style.visibility</p:attrName>
+                                        </p:attrNameLst>
+                                      </p:cBhvr>
+                                      <p:to>
+                                        <p:strVal val="visible"/>
+                                      </p:to>
+                                    </p:set>
+                                    <p:animEffect transition="in" filter="fade">
+                                      <p:cBhvr>
+                                        <p:cTn id="84" dur="500"/>
+                                        <p:tgtEl>
+                                          <p:spTgt spid="15"/>
+                                        </p:tgtEl>
+                                      </p:cBhvr>
+                                    </p:animEffect>
+                                  </p:childTnLst>
+                                </p:cTn>
+                              </p:par>
+                              <p:par>
+                                <p:cTn id="85" presetID="10" presetClass="entr" presetSubtype="0" fill="hold" grpId="0" nodeType="withEffect">
+                                  <p:stCondLst>
+                                    <p:cond delay="0"/>
+                                  </p:stCondLst>
+                                  <p:childTnLst>
+                                    <p:set>
+                                      <p:cBhvr>
+                                        <p:cTn id="86" dur="1" fill="hold">
+                                          <p:stCondLst>
+                                            <p:cond delay="0"/>
+                                          </p:stCondLst>
+                                        </p:cTn>
+                                        <p:tgtEl>
+                                          <p:spTgt spid="28"/>
+                                        </p:tgtEl>
+                                        <p:attrNameLst>
+                                          <p:attrName>style.visibility</p:attrName>
+                                        </p:attrNameLst>
+                                      </p:cBhvr>
+                                      <p:to>
+                                        <p:strVal val="visible"/>
+                                      </p:to>
+                                    </p:set>
+                                    <p:animEffect transition="in" filter="fade">
+                                      <p:cBhvr>
+                                        <p:cTn id="87" dur="500"/>
+                                        <p:tgtEl>
+                                          <p:spTgt spid="28"/>
+                                        </p:tgtEl>
+                                      </p:cBhvr>
+                                    </p:animEffect>
+                                  </p:childTnLst>
+                                </p:cTn>
+                              </p:par>
+                              <p:par>
+                                <p:cTn id="88" presetID="10" presetClass="entr" presetSubtype="0" fill="hold" grpId="0" nodeType="withEffect">
+                                  <p:stCondLst>
+                                    <p:cond delay="0"/>
+                                  </p:stCondLst>
+                                  <p:childTnLst>
+                                    <p:set>
+                                      <p:cBhvr>
+                                        <p:cTn id="89" dur="1" fill="hold">
+                                          <p:stCondLst>
+                                            <p:cond delay="0"/>
+                                          </p:stCondLst>
+                                        </p:cTn>
+                                        <p:tgtEl>
+                                          <p:spTgt spid="29"/>
+                                        </p:tgtEl>
+                                        <p:attrNameLst>
+                                          <p:attrName>style.visibility</p:attrName>
+                                        </p:attrNameLst>
+                                      </p:cBhvr>
+                                      <p:to>
+                                        <p:strVal val="visible"/>
+                                      </p:to>
+                                    </p:set>
+                                    <p:animEffect transition="in" filter="fade">
+                                      <p:cBhvr>
+                                        <p:cTn id="90" dur="500"/>
+                                        <p:tgtEl>
+                                          <p:spTgt spid="29"/>
+                                        </p:tgtEl>
+                                      </p:cBhvr>
+                                    </p:animEffect>
+                                  </p:childTnLst>
+                                </p:cTn>
+                              </p:par>
+                              <p:par>
+                                <p:cTn id="91" presetID="10" presetClass="entr" presetSubtype="0" fill="hold" grpId="0" nodeType="withEffect">
+                                  <p:stCondLst>
+                                    <p:cond delay="0"/>
+                                  </p:stCondLst>
+                                  <p:childTnLst>
+                                    <p:set>
+                                      <p:cBhvr>
+                                        <p:cTn id="92" dur="1" fill="hold">
+                                          <p:stCondLst>
+                                            <p:cond delay="0"/>
+                                          </p:stCondLst>
+                                        </p:cTn>
+                                        <p:tgtEl>
+                                          <p:spTgt spid="30"/>
+                                        </p:tgtEl>
+                                        <p:attrNameLst>
+                                          <p:attrName>style.visibility</p:attrName>
+                                        </p:attrNameLst>
+                                      </p:cBhvr>
+                                      <p:to>
+                                        <p:strVal val="visible"/>
+                                      </p:to>
+                                    </p:set>
+                                    <p:animEffect transition="in" filter="fade">
+                                      <p:cBhvr>
+                                        <p:cTn id="93" dur="500"/>
+                                        <p:tgtEl>
+                                          <p:spTgt spid="30"/>
+                                        </p:tgtEl>
+                                      </p:cBhvr>
+                                    </p:animEffect>
+                                  </p:childTnLst>
+                                </p:cTn>
+                              </p:par>
+                              <p:par>
+                                <p:cTn id="94" presetID="10" presetClass="entr" presetSubtype="0" fill="hold" grpId="0" nodeType="withEffect">
+                                  <p:stCondLst>
+                                    <p:cond delay="0"/>
+                                  </p:stCondLst>
+                                  <p:childTnLst>
+                                    <p:set>
+                                      <p:cBhvr>
+                                        <p:cTn id="95" dur="1" fill="hold">
+                                          <p:stCondLst>
+                                            <p:cond delay="0"/>
+                                          </p:stCondLst>
+                                        </p:cTn>
+                                        <p:tgtEl>
+                                          <p:spTgt spid="31"/>
+                                        </p:tgtEl>
+                                        <p:attrNameLst>
+                                          <p:attrName>style.visibility</p:attrName>
+                                        </p:attrNameLst>
+                                      </p:cBhvr>
+                                      <p:to>
+                                        <p:strVal val="visible"/>
+                                      </p:to>
+                                    </p:set>
+                                    <p:animEffect transition="in" filter="fade">
+                                      <p:cBhvr>
+                                        <p:cTn id="96" dur="500"/>
+                                        <p:tgtEl>
+                                          <p:spTgt spid="31"/>
+                                        </p:tgtEl>
+                                      </p:cBhvr>
+                                    </p:animEffect>
+                                  </p:childTnLst>
+                                </p:cTn>
+                              </p:par>
+                            </p:childTnLst>
+                          </p:cTn>
+                        </p:par>
+                      </p:childTnLst>
+                    </p:cTn>
+                  </p:par>
+                </p:childTnLst>
+              </p:cTn>
+              <p:prevCondLst>
+                <p:cond evt="onPrev" delay="0">
+                  <p:tgtEl>
+                    <p:sldTgt/>
+                  </p:tgtEl>
+                </p:cond>
+              </p:prevCondLst>
+              <p:nextCondLst>
+                <p:cond evt="onNext" delay="0">
+                  <p:tgtEl>
+                    <p:sldTgt/>
+                  </p:tgtEl>
+                </p:cond>
+              </p:nextCondLst>
+            </p:seq>
+          </p:childTnLst>
+        </p:cTn>
+      </p:par>
+    </p:tnLst>
+    <p:bldLst>
+      <p:bldP spid="18" grpId="0" animBg="1"/>
+      <p:bldP spid="19" grpId="0" animBg="1"/>
+      <p:bldP spid="20" grpId="0" animBg="1"/>
+      <p:bldP spid="21" grpId="0" animBg="1"/>
+      <p:bldP spid="22" grpId="0" animBg="1"/>
+      <p:bldP spid="23" grpId="0" animBg="1"/>
+      <p:bldP spid="24" grpId="0"/>
+      <p:bldP spid="26" grpId="0" animBg="1"/>
+      <p:bldP spid="27" grpId="0"/>
+      <p:bldP spid="28" grpId="0" animBg="1"/>
+      <p:bldP spid="29" grpId="0"/>
+      <p:bldP spid="30" grpId="0"/>
+      <p:bldP spid="31" grpId="0" animBg="1"/>
+    </p:bldLst>
+  </p:timing>
+</p:sld>
+</file>
+
+<file path=ppt/slides/slide15.xml><?xml version="1.0" encoding="utf-8"?>
+<p:sld xmlns:a="http://schemas.openxmlformats.org/drawingml/2006/main" xmlns:r="http://schemas.openxmlformats.org/officeDocument/2006/relationships" xmlns:p="http://schemas.openxmlformats.org/presentationml/2006/main">
+  <p:cSld>
+    <p:spTree>
+      <p:nvGrpSpPr>
         <p:cNvPr id="1" name="Shape 202"/>
         <p:cNvGrpSpPr/>
         <p:nvPr/>
@@ -16113,7 +19614,7 @@
 </p:sld>
 </file>
 
-<file path=ppt/slides/slide15.xml><?xml version="1.0" encoding="utf-8"?>
+<file path=ppt/slides/slide16.xml><?xml version="1.0" encoding="utf-8"?>
 <p:sld xmlns:a="http://schemas.openxmlformats.org/drawingml/2006/main" xmlns:r="http://schemas.openxmlformats.org/officeDocument/2006/relationships" xmlns:p="http://schemas.openxmlformats.org/presentationml/2006/main">
   <p:cSld>
     <p:spTree>
@@ -17600,7 +21101,7 @@
 </p:sld>
 </file>
 
-<file path=ppt/slides/slide16.xml><?xml version="1.0" encoding="utf-8"?>
+<file path=ppt/slides/slide17.xml><?xml version="1.0" encoding="utf-8"?>
 <p:sld xmlns:a="http://schemas.openxmlformats.org/drawingml/2006/main" xmlns:r="http://schemas.openxmlformats.org/officeDocument/2006/relationships" xmlns:p="http://schemas.openxmlformats.org/presentationml/2006/main">
   <p:cSld>
     <p:spTree>
@@ -18043,7 +21544,7 @@
 </p:sld>
 </file>
 
-<file path=ppt/slides/slide17.xml><?xml version="1.0" encoding="utf-8"?>
+<file path=ppt/slides/slide18.xml><?xml version="1.0" encoding="utf-8"?>
 <p:sld xmlns:a="http://schemas.openxmlformats.org/drawingml/2006/main" xmlns:r="http://schemas.openxmlformats.org/officeDocument/2006/relationships" xmlns:p="http://schemas.openxmlformats.org/presentationml/2006/main">
   <p:cSld>
     <p:spTree>

</xml_diff>

<commit_message>
ODSA Class Update 10.18.21
</commit_message>
<xml_diff>
--- a/Lectures/(1) Data Manipulation - Basics.pptx
+++ b/Lectures/(1) Data Manipulation - Basics.pptx
@@ -18,8 +18,8 @@
     <p:sldId id="264" r:id="rId9"/>
     <p:sldId id="265" r:id="rId10"/>
     <p:sldId id="266" r:id="rId11"/>
-    <p:sldId id="267" r:id="rId12"/>
-    <p:sldId id="278" r:id="rId13"/>
+    <p:sldId id="278" r:id="rId12"/>
+    <p:sldId id="267" r:id="rId13"/>
     <p:sldId id="274" r:id="rId14"/>
     <p:sldId id="297" r:id="rId15"/>
     <p:sldId id="260" r:id="rId16"/>
@@ -38,14 +38,14 @@
       <p:boldItalic r:id="rId24"/>
     </p:embeddedFont>
     <p:embeddedFont>
-      <p:font typeface="Lato" panose="020B0604020202020204" charset="0"/>
+      <p:font typeface="Lato" panose="020F0502020204030203" pitchFamily="34" charset="0"/>
       <p:regular r:id="rId25"/>
       <p:bold r:id="rId26"/>
       <p:italic r:id="rId27"/>
       <p:boldItalic r:id="rId28"/>
     </p:embeddedFont>
     <p:embeddedFont>
-      <p:font typeface="Raleway" panose="020B0604020202020204" charset="0"/>
+      <p:font typeface="Raleway" pitchFamily="2" charset="0"/>
       <p:regular r:id="rId29"/>
       <p:bold r:id="rId30"/>
       <p:italic r:id="rId31"/>
@@ -2217,7 +2217,7 @@
   <p:cSld>
     <p:spTree>
       <p:nvGrpSpPr>
-        <p:cNvPr id="1" name="Shape 250"/>
+        <p:cNvPr id="1" name="Shape 222"/>
         <p:cNvGrpSpPr/>
         <p:nvPr/>
       </p:nvGrpSpPr>
@@ -2231,7 +2231,7 @@
       </p:grpSpPr>
       <p:sp>
         <p:nvSpPr>
-          <p:cNvPr id="251" name="Google Shape;251;g4f24fce185_2_438:notes"/>
+          <p:cNvPr id="223" name="Google Shape;223;g5038ce4af1_0_347:notes"/>
           <p:cNvSpPr txBox="1">
             <a:spLocks noGrp="1"/>
           </p:cNvSpPr>
@@ -2269,7 +2269,7 @@
       </p:sp>
       <p:sp>
         <p:nvSpPr>
-          <p:cNvPr id="252" name="Google Shape;252;g4f24fce185_2_438:notes"/>
+          <p:cNvPr id="224" name="Google Shape;224;g5038ce4af1_0_347:notes"/>
           <p:cNvSpPr>
             <a:spLocks noGrp="1" noRot="1" noChangeAspect="1"/>
           </p:cNvSpPr>
@@ -2321,7 +2321,7 @@
   <p:cSld>
     <p:spTree>
       <p:nvGrpSpPr>
-        <p:cNvPr id="1" name="Shape 222"/>
+        <p:cNvPr id="1" name="Shape 250"/>
         <p:cNvGrpSpPr/>
         <p:nvPr/>
       </p:nvGrpSpPr>
@@ -2335,7 +2335,7 @@
       </p:grpSpPr>
       <p:sp>
         <p:nvSpPr>
-          <p:cNvPr id="223" name="Google Shape;223;g5038ce4af1_0_347:notes"/>
+          <p:cNvPr id="251" name="Google Shape;251;g4f24fce185_2_438:notes"/>
           <p:cNvSpPr txBox="1">
             <a:spLocks noGrp="1"/>
           </p:cNvSpPr>
@@ -2373,7 +2373,7 @@
       </p:sp>
       <p:sp>
         <p:nvSpPr>
-          <p:cNvPr id="224" name="Google Shape;224;g5038ce4af1_0_347:notes"/>
+          <p:cNvPr id="252" name="Google Shape;252;g4f24fce185_2_438:notes"/>
           <p:cNvSpPr>
             <a:spLocks noGrp="1" noRot="1" noChangeAspect="1"/>
           </p:cNvSpPr>
@@ -3936,7 +3936,7 @@
               <a:buNone/>
             </a:pPr>
             <a:r>
-              <a:rPr lang="en-US" sz="1200">
+              <a:rPr lang="en-US" sz="1200" dirty="0">
                 <a:solidFill>
                   <a:schemeClr val="accent6">
                     <a:lumMod val="50000"/>
@@ -14304,180 +14304,6 @@
   <p:cSld>
     <p:spTree>
       <p:nvGrpSpPr>
-        <p:cNvPr id="1" name="Shape 253"/>
-        <p:cNvGrpSpPr/>
-        <p:nvPr/>
-      </p:nvGrpSpPr>
-      <p:grpSpPr>
-        <a:xfrm>
-          <a:off x="0" y="0"/>
-          <a:ext cx="0" cy="0"/>
-          <a:chOff x="0" y="0"/>
-          <a:chExt cx="0" cy="0"/>
-        </a:xfrm>
-      </p:grpSpPr>
-      <p:sp>
-        <p:nvSpPr>
-          <p:cNvPr id="254" name="Google Shape;254;p38"/>
-          <p:cNvSpPr txBox="1">
-            <a:spLocks noGrp="1"/>
-          </p:cNvSpPr>
-          <p:nvPr>
-            <p:ph type="ctrTitle"/>
-          </p:nvPr>
-        </p:nvSpPr>
-        <p:spPr>
-          <a:xfrm>
-            <a:off x="913795" y="609600"/>
-            <a:ext cx="10353900" cy="970500"/>
-          </a:xfrm>
-          <a:prstGeom prst="rect">
-            <a:avLst/>
-          </a:prstGeom>
-          <a:noFill/>
-          <a:ln>
-            <a:noFill/>
-          </a:ln>
-          <a:effectLst>
-            <a:outerShdw blurRad="25400">
-              <a:srgbClr val="000000">
-                <a:alpha val="45880"/>
-              </a:srgbClr>
-            </a:outerShdw>
-          </a:effectLst>
-        </p:spPr>
-        <p:txBody>
-          <a:bodyPr spcFirstLastPara="1" wrap="square" lIns="91425" tIns="45700" rIns="91425" bIns="45700" anchor="ctr" anchorCtr="0">
-            <a:noAutofit/>
-          </a:bodyPr>
-          <a:lstStyle/>
-          <a:p>
-            <a:pPr marL="0" lvl="0" indent="0" algn="l" rtl="0">
-              <a:spcBef>
-                <a:spcPts val="0"/>
-              </a:spcBef>
-              <a:spcAft>
-                <a:spcPts val="0"/>
-              </a:spcAft>
-              <a:buClr>
-                <a:schemeClr val="lt2"/>
-              </a:buClr>
-              <a:buSzPts val="4000"/>
-              <a:buFont typeface="Lustria"/>
-              <a:buNone/>
-            </a:pPr>
-            <a:r>
-              <a:rPr lang="en-US" sz="4800"/>
-              <a:t>What data types can you use?</a:t>
-            </a:r>
-            <a:endParaRPr sz="4800"/>
-          </a:p>
-        </p:txBody>
-      </p:sp>
-      <p:pic>
-        <p:nvPicPr>
-          <p:cNvPr id="255" name="Google Shape;255;p38"/>
-          <p:cNvPicPr preferRelativeResize="0"/>
-          <p:nvPr/>
-        </p:nvPicPr>
-        <p:blipFill>
-          <a:blip r:embed="rId3">
-            <a:alphaModFix/>
-          </a:blip>
-          <a:stretch>
-            <a:fillRect/>
-          </a:stretch>
-        </p:blipFill>
-        <p:spPr>
-          <a:xfrm>
-            <a:off x="1857313" y="1676650"/>
-            <a:ext cx="8466875" cy="5181350"/>
-          </a:xfrm>
-          <a:prstGeom prst="rect">
-            <a:avLst/>
-          </a:prstGeom>
-          <a:noFill/>
-          <a:ln>
-            <a:noFill/>
-          </a:ln>
-        </p:spPr>
-      </p:pic>
-      <p:sp>
-        <p:nvSpPr>
-          <p:cNvPr id="256" name="Google Shape;256;p38"/>
-          <p:cNvSpPr txBox="1"/>
-          <p:nvPr/>
-        </p:nvSpPr>
-        <p:spPr>
-          <a:xfrm>
-            <a:off x="3448700" y="6325925"/>
-            <a:ext cx="6184800" cy="3000000"/>
-          </a:xfrm>
-          <a:prstGeom prst="rect">
-            <a:avLst/>
-          </a:prstGeom>
-          <a:noFill/>
-          <a:ln>
-            <a:noFill/>
-          </a:ln>
-        </p:spPr>
-        <p:txBody>
-          <a:bodyPr spcFirstLastPara="1" wrap="square" lIns="91425" tIns="91425" rIns="91425" bIns="91425" anchor="t" anchorCtr="0">
-            <a:noAutofit/>
-          </a:bodyPr>
-          <a:lstStyle/>
-          <a:p>
-            <a:pPr marL="0" lvl="0" indent="0" algn="l" rtl="0">
-              <a:spcBef>
-                <a:spcPts val="0"/>
-              </a:spcBef>
-              <a:spcAft>
-                <a:spcPts val="0"/>
-              </a:spcAft>
-              <a:buNone/>
-            </a:pPr>
-            <a:r>
-              <a:rPr lang="en-US"/>
-              <a:t>Tutorial: </a:t>
-            </a:r>
-            <a:r>
-              <a:rPr lang="en-US" u="sng">
-                <a:solidFill>
-                  <a:schemeClr val="hlink"/>
-                </a:solidFill>
-                <a:hlinkClick r:id="rId4"/>
-              </a:rPr>
-              <a:t>https://www.tutorialspoint.com/mysql/mysql-data-types.htm</a:t>
-            </a:r>
-            <a:endParaRPr/>
-          </a:p>
-          <a:p>
-            <a:pPr marL="0" lvl="0" indent="0" algn="l" rtl="0">
-              <a:spcBef>
-                <a:spcPts val="0"/>
-              </a:spcBef>
-              <a:spcAft>
-                <a:spcPts val="0"/>
-              </a:spcAft>
-              <a:buNone/>
-            </a:pPr>
-            <a:endParaRPr/>
-          </a:p>
-        </p:txBody>
-      </p:sp>
-    </p:spTree>
-  </p:cSld>
-  <p:clrMapOvr>
-    <a:masterClrMapping/>
-  </p:clrMapOvr>
-</p:sld>
-</file>
-
-<file path=ppt/slides/slide12.xml><?xml version="1.0" encoding="utf-8"?>
-<p:sld xmlns:a="http://schemas.openxmlformats.org/drawingml/2006/main" xmlns:r="http://schemas.openxmlformats.org/officeDocument/2006/relationships" xmlns:p="http://schemas.openxmlformats.org/presentationml/2006/main">
-  <p:cSld>
-    <p:spTree>
-      <p:nvGrpSpPr>
         <p:cNvPr id="1" name="Shape 225"/>
         <p:cNvGrpSpPr/>
         <p:nvPr/>
@@ -15179,7 +15005,7 @@
               <a:buChar char="●"/>
             </a:pPr>
             <a:r>
-              <a:rPr lang="en-US" sz="1800">
+              <a:rPr lang="en-US" sz="1800" dirty="0">
                 <a:latin typeface="Calibri"/>
                 <a:ea typeface="Calibri"/>
                 <a:cs typeface="Calibri"/>
@@ -15187,7 +15013,7 @@
               </a:rPr>
               <a:t>Size matters as scale increases.</a:t>
             </a:r>
-            <a:endParaRPr sz="1800">
+            <a:endParaRPr sz="1800" dirty="0">
               <a:latin typeface="Calibri"/>
               <a:ea typeface="Calibri"/>
               <a:cs typeface="Calibri"/>
@@ -15210,7 +15036,7 @@
               <a:buChar char="●"/>
             </a:pPr>
             <a:r>
-              <a:rPr lang="en-US" sz="1800">
+              <a:rPr lang="en-US" sz="1800" dirty="0">
                 <a:latin typeface="Calibri"/>
                 <a:ea typeface="Calibri"/>
                 <a:cs typeface="Calibri"/>
@@ -15218,7 +15044,7 @@
               </a:rPr>
               <a:t>Signed values: positive and negative</a:t>
             </a:r>
-            <a:endParaRPr sz="1800">
+            <a:endParaRPr sz="1800" dirty="0">
               <a:latin typeface="Calibri"/>
               <a:ea typeface="Calibri"/>
               <a:cs typeface="Calibri"/>
@@ -15241,7 +15067,7 @@
               <a:buChar char="○"/>
             </a:pPr>
             <a:r>
-              <a:rPr lang="en-US" sz="1800">
+              <a:rPr lang="en-US" sz="1800" dirty="0">
                 <a:latin typeface="Calibri"/>
                 <a:ea typeface="Calibri"/>
                 <a:cs typeface="Calibri"/>
@@ -15249,7 +15075,7 @@
               </a:rPr>
               <a:t>Unsigned values: positive only</a:t>
             </a:r>
-            <a:endParaRPr sz="1800">
+            <a:endParaRPr sz="1800" dirty="0">
               <a:latin typeface="Calibri"/>
               <a:ea typeface="Calibri"/>
               <a:cs typeface="Calibri"/>
@@ -15272,7 +15098,7 @@
               <a:buChar char="●"/>
             </a:pPr>
             <a:r>
-              <a:rPr lang="en-US" sz="1800">
+              <a:rPr lang="en-US" sz="1800" dirty="0">
                 <a:latin typeface="Calibri"/>
                 <a:ea typeface="Calibri"/>
                 <a:cs typeface="Calibri"/>
@@ -15280,7 +15106,7 @@
               </a:rPr>
               <a:t>“Big” Data Types:  Hold very “large” signed/unsigned values</a:t>
             </a:r>
-            <a:endParaRPr sz="1800">
+            <a:endParaRPr sz="1800" dirty="0">
               <a:latin typeface="Calibri"/>
               <a:ea typeface="Calibri"/>
               <a:cs typeface="Calibri"/>
@@ -15300,7 +15126,7 @@
               </a:spcAft>
               <a:buNone/>
             </a:pPr>
-            <a:endParaRPr sz="1800">
+            <a:endParaRPr sz="1800" dirty="0">
               <a:latin typeface="Calibri"/>
               <a:ea typeface="Calibri"/>
               <a:cs typeface="Calibri"/>
@@ -15347,7 +15173,7 @@
               <a:buNone/>
             </a:pPr>
             <a:r>
-              <a:rPr lang="en-US" sz="1800">
+              <a:rPr lang="en-US" sz="1800" dirty="0">
                 <a:latin typeface="Calibri"/>
                 <a:ea typeface="Calibri"/>
                 <a:cs typeface="Calibri"/>
@@ -15355,7 +15181,7 @@
               </a:rPr>
               <a:t>Precision: number of digits</a:t>
             </a:r>
-            <a:endParaRPr sz="1800">
+            <a:endParaRPr sz="1800" dirty="0">
               <a:latin typeface="Calibri"/>
               <a:ea typeface="Calibri"/>
               <a:cs typeface="Calibri"/>
@@ -15376,7 +15202,7 @@
               <a:buNone/>
             </a:pPr>
             <a:r>
-              <a:rPr lang="en-US" sz="1800">
+              <a:rPr lang="en-US" sz="1800" dirty="0">
                 <a:latin typeface="Calibri"/>
                 <a:ea typeface="Calibri"/>
                 <a:cs typeface="Calibri"/>
@@ -15384,7 +15210,7 @@
               </a:rPr>
               <a:t>Scale: number of digits right of decimal point</a:t>
             </a:r>
-            <a:endParaRPr sz="1800">
+            <a:endParaRPr sz="1800" dirty="0">
               <a:latin typeface="Calibri"/>
               <a:ea typeface="Calibri"/>
               <a:cs typeface="Calibri"/>
@@ -15405,7 +15231,7 @@
               <a:buNone/>
             </a:pPr>
             <a:r>
-              <a:rPr lang="en-US" sz="1800">
+              <a:rPr lang="en-US" sz="1800" dirty="0">
                 <a:latin typeface="Calibri"/>
                 <a:ea typeface="Calibri"/>
                 <a:cs typeface="Calibri"/>
@@ -15413,7 +15239,7 @@
               </a:rPr>
               <a:t>Fixed-point decimals: represent exact values</a:t>
             </a:r>
-            <a:endParaRPr sz="1800">
+            <a:endParaRPr sz="1800" dirty="0">
               <a:latin typeface="Calibri"/>
               <a:ea typeface="Calibri"/>
               <a:cs typeface="Calibri"/>
@@ -15434,7 +15260,7 @@
               <a:buNone/>
             </a:pPr>
             <a:r>
-              <a:rPr lang="en-US" sz="1800">
+              <a:rPr lang="en-US" sz="1800" dirty="0">
                 <a:latin typeface="Calibri"/>
                 <a:ea typeface="Calibri"/>
                 <a:cs typeface="Calibri"/>
@@ -15442,7 +15268,7 @@
               </a:rPr>
               <a:t>Floating-point decimals: represent approximate values</a:t>
             </a:r>
-            <a:endParaRPr sz="1800">
+            <a:endParaRPr sz="1800" dirty="0">
               <a:latin typeface="Calibri"/>
               <a:ea typeface="Calibri"/>
               <a:cs typeface="Calibri"/>
@@ -15463,7 +15289,7 @@
               <a:buNone/>
             </a:pPr>
             <a:r>
-              <a:rPr lang="en-US" sz="1800">
+              <a:rPr lang="en-US" sz="1800" dirty="0">
                 <a:latin typeface="Calibri"/>
                 <a:ea typeface="Calibri"/>
                 <a:cs typeface="Calibri"/>
@@ -15471,6 +15297,180 @@
               </a:rPr>
               <a:t>BLOB: binary large object, stores files as binary data</a:t>
             </a:r>
+            <a:endParaRPr dirty="0"/>
+          </a:p>
+        </p:txBody>
+      </p:sp>
+    </p:spTree>
+  </p:cSld>
+  <p:clrMapOvr>
+    <a:masterClrMapping/>
+  </p:clrMapOvr>
+</p:sld>
+</file>
+
+<file path=ppt/slides/slide12.xml><?xml version="1.0" encoding="utf-8"?>
+<p:sld xmlns:a="http://schemas.openxmlformats.org/drawingml/2006/main" xmlns:r="http://schemas.openxmlformats.org/officeDocument/2006/relationships" xmlns:p="http://schemas.openxmlformats.org/presentationml/2006/main">
+  <p:cSld>
+    <p:spTree>
+      <p:nvGrpSpPr>
+        <p:cNvPr id="1" name="Shape 253"/>
+        <p:cNvGrpSpPr/>
+        <p:nvPr/>
+      </p:nvGrpSpPr>
+      <p:grpSpPr>
+        <a:xfrm>
+          <a:off x="0" y="0"/>
+          <a:ext cx="0" cy="0"/>
+          <a:chOff x="0" y="0"/>
+          <a:chExt cx="0" cy="0"/>
+        </a:xfrm>
+      </p:grpSpPr>
+      <p:sp>
+        <p:nvSpPr>
+          <p:cNvPr id="254" name="Google Shape;254;p38"/>
+          <p:cNvSpPr txBox="1">
+            <a:spLocks noGrp="1"/>
+          </p:cNvSpPr>
+          <p:nvPr>
+            <p:ph type="ctrTitle"/>
+          </p:nvPr>
+        </p:nvSpPr>
+        <p:spPr>
+          <a:xfrm>
+            <a:off x="913795" y="609600"/>
+            <a:ext cx="10353900" cy="970500"/>
+          </a:xfrm>
+          <a:prstGeom prst="rect">
+            <a:avLst/>
+          </a:prstGeom>
+          <a:noFill/>
+          <a:ln>
+            <a:noFill/>
+          </a:ln>
+          <a:effectLst>
+            <a:outerShdw blurRad="25400">
+              <a:srgbClr val="000000">
+                <a:alpha val="45880"/>
+              </a:srgbClr>
+            </a:outerShdw>
+          </a:effectLst>
+        </p:spPr>
+        <p:txBody>
+          <a:bodyPr spcFirstLastPara="1" wrap="square" lIns="91425" tIns="45700" rIns="91425" bIns="45700" anchor="ctr" anchorCtr="0">
+            <a:noAutofit/>
+          </a:bodyPr>
+          <a:lstStyle/>
+          <a:p>
+            <a:pPr marL="0" lvl="0" indent="0" algn="l" rtl="0">
+              <a:spcBef>
+                <a:spcPts val="0"/>
+              </a:spcBef>
+              <a:spcAft>
+                <a:spcPts val="0"/>
+              </a:spcAft>
+              <a:buClr>
+                <a:schemeClr val="lt2"/>
+              </a:buClr>
+              <a:buSzPts val="4000"/>
+              <a:buFont typeface="Lustria"/>
+              <a:buNone/>
+            </a:pPr>
+            <a:r>
+              <a:rPr lang="en-US" sz="4800"/>
+              <a:t>What data types can you use?</a:t>
+            </a:r>
+            <a:endParaRPr sz="4800"/>
+          </a:p>
+        </p:txBody>
+      </p:sp>
+      <p:pic>
+        <p:nvPicPr>
+          <p:cNvPr id="255" name="Google Shape;255;p38"/>
+          <p:cNvPicPr preferRelativeResize="0"/>
+          <p:nvPr/>
+        </p:nvPicPr>
+        <p:blipFill>
+          <a:blip r:embed="rId3">
+            <a:alphaModFix/>
+          </a:blip>
+          <a:stretch>
+            <a:fillRect/>
+          </a:stretch>
+        </p:blipFill>
+        <p:spPr>
+          <a:xfrm>
+            <a:off x="1857313" y="1676650"/>
+            <a:ext cx="8466875" cy="5181350"/>
+          </a:xfrm>
+          <a:prstGeom prst="rect">
+            <a:avLst/>
+          </a:prstGeom>
+          <a:noFill/>
+          <a:ln>
+            <a:noFill/>
+          </a:ln>
+        </p:spPr>
+      </p:pic>
+      <p:sp>
+        <p:nvSpPr>
+          <p:cNvPr id="256" name="Google Shape;256;p38"/>
+          <p:cNvSpPr txBox="1"/>
+          <p:nvPr/>
+        </p:nvSpPr>
+        <p:spPr>
+          <a:xfrm>
+            <a:off x="3448700" y="6325925"/>
+            <a:ext cx="6184800" cy="3000000"/>
+          </a:xfrm>
+          <a:prstGeom prst="rect">
+            <a:avLst/>
+          </a:prstGeom>
+          <a:noFill/>
+          <a:ln>
+            <a:noFill/>
+          </a:ln>
+        </p:spPr>
+        <p:txBody>
+          <a:bodyPr spcFirstLastPara="1" wrap="square" lIns="91425" tIns="91425" rIns="91425" bIns="91425" anchor="t" anchorCtr="0">
+            <a:noAutofit/>
+          </a:bodyPr>
+          <a:lstStyle/>
+          <a:p>
+            <a:pPr marL="0" lvl="0" indent="0" algn="l" rtl="0">
+              <a:spcBef>
+                <a:spcPts val="0"/>
+              </a:spcBef>
+              <a:spcAft>
+                <a:spcPts val="0"/>
+              </a:spcAft>
+              <a:buNone/>
+            </a:pPr>
+            <a:r>
+              <a:rPr lang="en-US"/>
+              <a:t>Tutorial: </a:t>
+            </a:r>
+            <a:r>
+              <a:rPr lang="en-US" u="sng">
+                <a:solidFill>
+                  <a:schemeClr val="hlink"/>
+                </a:solidFill>
+                <a:hlinkClick r:id="rId4"/>
+              </a:rPr>
+              <a:t>https://www.tutorialspoint.com/mysql/mysql-data-types.htm</a:t>
+            </a:r>
+            <a:endParaRPr/>
+          </a:p>
+          <a:p>
+            <a:pPr marL="0" lvl="0" indent="0" algn="l" rtl="0">
+              <a:spcBef>
+                <a:spcPts val="0"/>
+              </a:spcBef>
+              <a:spcAft>
+                <a:spcPts val="0"/>
+              </a:spcAft>
+              <a:buNone/>
+            </a:pPr>
             <a:endParaRPr/>
           </a:p>
         </p:txBody>
@@ -21756,7 +21756,7 @@
         <p:spPr>
           <a:xfrm>
             <a:off x="6489116" y="1745175"/>
-            <a:ext cx="5702884" cy="5262979"/>
+            <a:ext cx="5702884" cy="5632311"/>
           </a:xfrm>
           <a:prstGeom prst="rect">
             <a:avLst/>
@@ -21848,7 +21848,7 @@
               <a:rPr lang="en-US" sz="2400" dirty="0">
                 <a:latin typeface="Lato" panose="020B0604020202020204" charset="0"/>
               </a:rPr>
-              <a:t>Keywords used as field names are encased in back-tick (`) characters</a:t>
+              <a:t>Keywords used as field names are encased in bracket ([]) characters</a:t>
             </a:r>
           </a:p>
           <a:p>

</xml_diff>